<commit_message>
add lecture 9 - defensive behavior
</commit_message>
<xml_diff>
--- a/lecture slides/lecture 7 - hedonics.pptx
+++ b/lecture slides/lecture 7 - hedonics.pptx
@@ -1137,7 +1137,7 @@
   <pc:docChgLst>
     <pc:chgData name="Parthum, Bryan" userId="0944d42a-0297-47b7-847f-b5cd4d2f087f" providerId="ADAL" clId="{90A99638-78E0-42BB-8D3E-C060976E3379}"/>
     <pc:docChg chg="undo redo custSel addSld delSld modSld sldOrd modMainMaster modSection">
-      <pc:chgData name="Parthum, Bryan" userId="0944d42a-0297-47b7-847f-b5cd4d2f087f" providerId="ADAL" clId="{90A99638-78E0-42BB-8D3E-C060976E3379}" dt="2022-09-14T19:14:06.038" v="6627" actId="20577"/>
+      <pc:chgData name="Parthum, Bryan" userId="0944d42a-0297-47b7-847f-b5cd4d2f087f" providerId="ADAL" clId="{90A99638-78E0-42BB-8D3E-C060976E3379}" dt="2022-09-20T22:50:29.058" v="6629" actId="14100"/>
       <pc:docMkLst>
         <pc:docMk/>
       </pc:docMkLst>
@@ -2495,13 +2495,13 @@
         </pc:picChg>
       </pc:sldChg>
       <pc:sldChg chg="addSp delSp modSp add mod">
-        <pc:chgData name="Parthum, Bryan" userId="0944d42a-0297-47b7-847f-b5cd4d2f087f" providerId="ADAL" clId="{90A99638-78E0-42BB-8D3E-C060976E3379}" dt="2022-09-14T18:43:57.612" v="5066" actId="1076"/>
+        <pc:chgData name="Parthum, Bryan" userId="0944d42a-0297-47b7-847f-b5cd4d2f087f" providerId="ADAL" clId="{90A99638-78E0-42BB-8D3E-C060976E3379}" dt="2022-09-20T22:50:29.058" v="6629" actId="14100"/>
         <pc:sldMkLst>
           <pc:docMk/>
           <pc:sldMk cId="3349269401" sldId="483"/>
         </pc:sldMkLst>
         <pc:spChg chg="mod">
-          <ac:chgData name="Parthum, Bryan" userId="0944d42a-0297-47b7-847f-b5cd4d2f087f" providerId="ADAL" clId="{90A99638-78E0-42BB-8D3E-C060976E3379}" dt="2022-09-14T18:43:57.612" v="5066" actId="1076"/>
+          <ac:chgData name="Parthum, Bryan" userId="0944d42a-0297-47b7-847f-b5cd4d2f087f" providerId="ADAL" clId="{90A99638-78E0-42BB-8D3E-C060976E3379}" dt="2022-09-20T22:50:29.058" v="6629" actId="14100"/>
           <ac:spMkLst>
             <pc:docMk/>
             <pc:sldMk cId="3349269401" sldId="483"/>
@@ -6002,7 +6002,7 @@
           <a:p>
             <a:fld id="{C6F51268-28D7-4A1D-B6E7-7FC724367079}" type="datetimeFigureOut">
               <a:rPr lang="en-US" smtClean="0"/>
-              <a:t>9/14/2022</a:t>
+              <a:t>9/20/2022</a:t>
             </a:fld>
             <a:endParaRPr lang="en-US"/>
           </a:p>
@@ -11241,8 +11241,8 @@
           </a:p>
         </p:txBody>
       </p:sp>
-      <mc:AlternateContent xmlns:mc="http://schemas.openxmlformats.org/markup-compatibility/2006">
-        <mc:Choice xmlns:a14="http://schemas.microsoft.com/office/drawing/2010/main" Requires="a14">
+      <mc:AlternateContent xmlns:mc="http://schemas.openxmlformats.org/markup-compatibility/2006" xmlns:a14="http://schemas.microsoft.com/office/drawing/2010/main">
+        <mc:Choice Requires="a14">
           <p:sp>
             <p:nvSpPr>
               <p:cNvPr id="36" name="Title 2">
@@ -11450,7 +11450,7 @@
             </p:txBody>
           </p:sp>
         </mc:Choice>
-        <mc:Fallback>
+        <mc:Fallback xmlns="">
           <p:sp>
             <p:nvSpPr>
               <p:cNvPr id="36" name="Title 2">
@@ -12301,8 +12301,8 @@
           </a:p>
         </p:txBody>
       </p:sp>
-      <mc:AlternateContent xmlns:mc="http://schemas.openxmlformats.org/markup-compatibility/2006">
-        <mc:Choice xmlns:a14="http://schemas.microsoft.com/office/drawing/2010/main" Requires="a14">
+      <mc:AlternateContent xmlns:mc="http://schemas.openxmlformats.org/markup-compatibility/2006" xmlns:a14="http://schemas.microsoft.com/office/drawing/2010/main">
+        <mc:Choice Requires="a14">
           <p:sp>
             <p:nvSpPr>
               <p:cNvPr id="36" name="Title 2">
@@ -12510,7 +12510,7 @@
             </p:txBody>
           </p:sp>
         </mc:Choice>
-        <mc:Fallback>
+        <mc:Fallback xmlns="">
           <p:sp>
             <p:nvSpPr>
               <p:cNvPr id="36" name="Title 2">
@@ -15557,8 +15557,8 @@
           </a:p>
         </p:txBody>
       </p:sp>
-      <mc:AlternateContent xmlns:mc="http://schemas.openxmlformats.org/markup-compatibility/2006">
-        <mc:Choice xmlns:a14="http://schemas.microsoft.com/office/drawing/2010/main" Requires="a14">
+      <mc:AlternateContent xmlns:mc="http://schemas.openxmlformats.org/markup-compatibility/2006" xmlns:a14="http://schemas.microsoft.com/office/drawing/2010/main">
+        <mc:Choice Requires="a14">
           <p:sp>
             <p:nvSpPr>
               <p:cNvPr id="29" name="Title 2">
@@ -15766,7 +15766,7 @@
             </p:txBody>
           </p:sp>
         </mc:Choice>
-        <mc:Fallback>
+        <mc:Fallback xmlns="">
           <p:sp>
             <p:nvSpPr>
               <p:cNvPr id="29" name="Title 2">
@@ -18183,8 +18183,8 @@
           </a:p>
         </p:txBody>
       </p:sp>
-      <mc:AlternateContent xmlns:mc="http://schemas.openxmlformats.org/markup-compatibility/2006">
-        <mc:Choice xmlns:a14="http://schemas.microsoft.com/office/drawing/2010/main" Requires="a14">
+      <mc:AlternateContent xmlns:mc="http://schemas.openxmlformats.org/markup-compatibility/2006" xmlns:a14="http://schemas.microsoft.com/office/drawing/2010/main">
+        <mc:Choice Requires="a14">
           <p:sp>
             <p:nvSpPr>
               <p:cNvPr id="29" name="Title 2">
@@ -18392,7 +18392,7 @@
             </p:txBody>
           </p:sp>
         </mc:Choice>
-        <mc:Fallback>
+        <mc:Fallback xmlns="">
           <p:sp>
             <p:nvSpPr>
               <p:cNvPr id="29" name="Title 2">
@@ -18998,8 +18998,8 @@
           </a:prstGeom>
         </p:spPr>
       </p:pic>
-      <mc:AlternateContent xmlns:mc="http://schemas.openxmlformats.org/markup-compatibility/2006">
-        <mc:Choice xmlns:a14="http://schemas.microsoft.com/office/drawing/2010/main" Requires="a14">
+      <mc:AlternateContent xmlns:mc="http://schemas.openxmlformats.org/markup-compatibility/2006" xmlns:a14="http://schemas.microsoft.com/office/drawing/2010/main">
+        <mc:Choice Requires="a14">
           <p:sp>
             <p:nvSpPr>
               <p:cNvPr id="38" name="TextBox 37">
@@ -19149,7 +19149,7 @@
             </p:txBody>
           </p:sp>
         </mc:Choice>
-        <mc:Fallback>
+        <mc:Fallback xmlns="">
           <p:sp>
             <p:nvSpPr>
               <p:cNvPr id="38" name="TextBox 37">
@@ -20920,8 +20920,8 @@
           </a:p>
         </p:txBody>
       </p:sp>
-      <mc:AlternateContent xmlns:mc="http://schemas.openxmlformats.org/markup-compatibility/2006">
-        <mc:Choice xmlns:a14="http://schemas.microsoft.com/office/drawing/2010/main" Requires="a14">
+      <mc:AlternateContent xmlns:mc="http://schemas.openxmlformats.org/markup-compatibility/2006" xmlns:a14="http://schemas.microsoft.com/office/drawing/2010/main">
+        <mc:Choice Requires="a14">
           <p:sp>
             <p:nvSpPr>
               <p:cNvPr id="29" name="Title 2">
@@ -21129,7 +21129,7 @@
             </p:txBody>
           </p:sp>
         </mc:Choice>
-        <mc:Fallback>
+        <mc:Fallback xmlns="">
           <p:sp>
             <p:nvSpPr>
               <p:cNvPr id="29" name="Title 2">
@@ -23674,859 +23674,8 @@
           <a:chExt cx="0" cy="0"/>
         </a:xfrm>
       </p:grpSpPr>
-      <mc:AlternateContent xmlns:mc="http://schemas.openxmlformats.org/markup-compatibility/2006">
-        <mc:Choice xmlns:a14="http://schemas.microsoft.com/office/drawing/2010/main" Requires="a14">
-          <p:sp>
-            <p:nvSpPr>
-              <p:cNvPr id="10" name="TextBox 9">
-                <a:extLst>
-                  <a:ext uri="{FF2B5EF4-FFF2-40B4-BE49-F238E27FC236}">
-                    <a16:creationId xmlns:a16="http://schemas.microsoft.com/office/drawing/2014/main" id="{E863E88C-22ED-47CC-B17C-6B97A3611646}"/>
-                  </a:ext>
-                </a:extLst>
-              </p:cNvPr>
-              <p:cNvSpPr txBox="1"/>
-              <p:nvPr/>
-            </p:nvSpPr>
-            <p:spPr>
-              <a:xfrm>
-                <a:off x="305663" y="1065214"/>
-                <a:ext cx="11580669" cy="881332"/>
-              </a:xfrm>
-              <a:prstGeom prst="rect">
-                <a:avLst/>
-              </a:prstGeom>
-              <a:noFill/>
-              <a:effectLst/>
-            </p:spPr>
-            <p:txBody>
-              <a:bodyPr wrap="square" rtlCol="0">
-                <a:spAutoFit/>
-              </a:bodyPr>
-              <a:lstStyle/>
-              <a:p>
-                <a:pPr lvl="1"/>
-                <a14:m>
-                  <m:oMathPara xmlns:m="http://schemas.openxmlformats.org/officeDocument/2006/math">
-                    <m:oMathParaPr>
-                      <m:jc m:val="centerGroup"/>
-                    </m:oMathParaPr>
-                    <m:oMath xmlns:m="http://schemas.openxmlformats.org/officeDocument/2006/math">
-                      <m:sSub>
-                        <m:sSubPr>
-                          <m:ctrlPr>
-                            <a:rPr lang="en-US" sz="2400" b="0" i="1" smtClean="0">
-                              <a:solidFill>
-                                <a:schemeClr val="tx1"/>
-                              </a:solidFill>
-                              <a:latin typeface="Cambria Math" panose="02040503050406030204" pitchFamily="18" charset="0"/>
-                              <a:cs typeface="Calibri Light" panose="020F0302020204030204" pitchFamily="34" charset="0"/>
-                            </a:rPr>
-                          </m:ctrlPr>
-                        </m:sSubPr>
-                        <m:e>
-                          <m:func>
-                            <m:funcPr>
-                              <m:ctrlPr>
-                                <a:rPr lang="en-US" sz="2400" b="0" i="1" smtClean="0">
-                                  <a:solidFill>
-                                    <a:schemeClr val="tx1"/>
-                                  </a:solidFill>
-                                  <a:latin typeface="Cambria Math" panose="02040503050406030204" pitchFamily="18" charset="0"/>
-                                  <a:cs typeface="Calibri Light" panose="020F0302020204030204" pitchFamily="34" charset="0"/>
-                                </a:rPr>
-                              </m:ctrlPr>
-                            </m:funcPr>
-                            <m:fName>
-                              <m:r>
-                                <m:rPr>
-                                  <m:sty m:val="p"/>
-                                </m:rPr>
-                                <a:rPr lang="en-US" sz="2400" b="0" i="0" smtClean="0">
-                                  <a:solidFill>
-                                    <a:schemeClr val="tx1"/>
-                                  </a:solidFill>
-                                  <a:latin typeface="Cambria Math" panose="02040503050406030204" pitchFamily="18" charset="0"/>
-                                  <a:cs typeface="Calibri Light" panose="020F0302020204030204" pitchFamily="34" charset="0"/>
-                                </a:rPr>
-                                <m:t>log</m:t>
-                              </m:r>
-                            </m:fName>
-                            <m:e>
-                              <m:d>
-                                <m:dPr>
-                                  <m:ctrlPr>
-                                    <a:rPr lang="en-US" sz="2400" b="0" i="1" smtClean="0">
-                                      <a:solidFill>
-                                        <a:schemeClr val="tx1"/>
-                                      </a:solidFill>
-                                      <a:latin typeface="Cambria Math" panose="02040503050406030204" pitchFamily="18" charset="0"/>
-                                      <a:cs typeface="Calibri Light" panose="020F0302020204030204" pitchFamily="34" charset="0"/>
-                                    </a:rPr>
-                                  </m:ctrlPr>
-                                </m:dPr>
-                                <m:e>
-                                  <m:r>
-                                    <a:rPr lang="en-US" sz="2400" b="0" i="1" smtClean="0">
-                                      <a:solidFill>
-                                        <a:schemeClr val="tx1"/>
-                                      </a:solidFill>
-                                      <a:latin typeface="Cambria Math" panose="02040503050406030204" pitchFamily="18" charset="0"/>
-                                      <a:cs typeface="Calibri Light" panose="020F0302020204030204" pitchFamily="34" charset="0"/>
-                                    </a:rPr>
-                                    <m:t>𝑝𝑟𝑖𝑐𝑒</m:t>
-                                  </m:r>
-                                </m:e>
-                              </m:d>
-                            </m:e>
-                          </m:func>
-                        </m:e>
-                        <m:sub>
-                          <m:r>
-                            <a:rPr lang="en-US" sz="2400" b="0" i="1" smtClean="0">
-                              <a:solidFill>
-                                <a:schemeClr val="tx1"/>
-                              </a:solidFill>
-                              <a:latin typeface="Cambria Math" panose="02040503050406030204" pitchFamily="18" charset="0"/>
-                              <a:cs typeface="Calibri Light" panose="020F0302020204030204" pitchFamily="34" charset="0"/>
-                            </a:rPr>
-                            <m:t>𝑖𝑗𝑡</m:t>
-                          </m:r>
-                        </m:sub>
-                      </m:sSub>
-                      <m:r>
-                        <a:rPr lang="en-US" sz="2400" b="0" i="1" smtClean="0">
-                          <a:solidFill>
-                            <a:schemeClr val="tx1"/>
-                          </a:solidFill>
-                          <a:latin typeface="Cambria Math" panose="02040503050406030204" pitchFamily="18" charset="0"/>
-                          <a:cs typeface="Calibri Light" panose="020F0302020204030204" pitchFamily="34" charset="0"/>
-                        </a:rPr>
-                        <m:t>=</m:t>
-                      </m:r>
-                      <m:sSub>
-                        <m:sSubPr>
-                          <m:ctrlPr>
-                            <a:rPr lang="en-US" sz="2400" b="0" i="1" smtClean="0">
-                              <a:solidFill>
-                                <a:schemeClr val="tx1"/>
-                              </a:solidFill>
-                              <a:latin typeface="Cambria Math" panose="02040503050406030204" pitchFamily="18" charset="0"/>
-                              <a:cs typeface="Calibri Light" panose="020F0302020204030204" pitchFamily="34" charset="0"/>
-                            </a:rPr>
-                          </m:ctrlPr>
-                        </m:sSubPr>
-                        <m:e>
-                          <m:r>
-                            <a:rPr lang="en-US" sz="2400" b="0" i="1" smtClean="0">
-                              <a:solidFill>
-                                <a:schemeClr val="tx1"/>
-                              </a:solidFill>
-                              <a:latin typeface="Cambria Math" panose="02040503050406030204" pitchFamily="18" charset="0"/>
-                              <a:cs typeface="Calibri Light" panose="020F0302020204030204" pitchFamily="34" charset="0"/>
-                            </a:rPr>
-                            <m:t>𝛽</m:t>
-                          </m:r>
-                        </m:e>
-                        <m:sub>
-                          <m:r>
-                            <a:rPr lang="en-US" sz="2400" b="0" i="1" smtClean="0">
-                              <a:solidFill>
-                                <a:schemeClr val="tx1"/>
-                              </a:solidFill>
-                              <a:latin typeface="Cambria Math" panose="02040503050406030204" pitchFamily="18" charset="0"/>
-                              <a:cs typeface="Calibri Light" panose="020F0302020204030204" pitchFamily="34" charset="0"/>
-                            </a:rPr>
-                            <m:t>0</m:t>
-                          </m:r>
-                        </m:sub>
-                      </m:sSub>
-                      <m:r>
-                        <a:rPr lang="en-US" sz="2400" b="0" i="1" smtClean="0">
-                          <a:solidFill>
-                            <a:schemeClr val="tx1"/>
-                          </a:solidFill>
-                          <a:latin typeface="Cambria Math" panose="02040503050406030204" pitchFamily="18" charset="0"/>
-                          <a:cs typeface="Calibri Light" panose="020F0302020204030204" pitchFamily="34" charset="0"/>
-                        </a:rPr>
-                        <m:t>+</m:t>
-                      </m:r>
-                      <m:sSub>
-                        <m:sSubPr>
-                          <m:ctrlPr>
-                            <a:rPr lang="en-US" sz="2400" b="0" i="1" smtClean="0">
-                              <a:solidFill>
-                                <a:schemeClr val="tx1"/>
-                              </a:solidFill>
-                              <a:latin typeface="Cambria Math" panose="02040503050406030204" pitchFamily="18" charset="0"/>
-                              <a:cs typeface="Calibri Light" panose="020F0302020204030204" pitchFamily="34" charset="0"/>
-                            </a:rPr>
-                          </m:ctrlPr>
-                        </m:sSubPr>
-                        <m:e>
-                          <m:r>
-                            <a:rPr lang="en-US" sz="2400" b="0" i="1" smtClean="0">
-                              <a:solidFill>
-                                <a:schemeClr val="tx1"/>
-                              </a:solidFill>
-                              <a:latin typeface="Cambria Math" panose="02040503050406030204" pitchFamily="18" charset="0"/>
-                              <a:cs typeface="Calibri Light" panose="020F0302020204030204" pitchFamily="34" charset="0"/>
-                            </a:rPr>
-                            <m:t>𝛽</m:t>
-                          </m:r>
-                        </m:e>
-                        <m:sub>
-                          <m:r>
-                            <a:rPr lang="en-US" sz="2400" b="0" i="1" smtClean="0">
-                              <a:solidFill>
-                                <a:schemeClr val="tx1"/>
-                              </a:solidFill>
-                              <a:latin typeface="Cambria Math" panose="02040503050406030204" pitchFamily="18" charset="0"/>
-                              <a:cs typeface="Calibri Light" panose="020F0302020204030204" pitchFamily="34" charset="0"/>
-                            </a:rPr>
-                            <m:t>1</m:t>
-                          </m:r>
-                        </m:sub>
-                      </m:sSub>
-                      <m:r>
-                        <a:rPr lang="en-US" sz="2400" b="0" i="1" smtClean="0">
-                          <a:solidFill>
-                            <a:schemeClr val="tx1"/>
-                          </a:solidFill>
-                          <a:latin typeface="Cambria Math" panose="02040503050406030204" pitchFamily="18" charset="0"/>
-                          <a:cs typeface="Calibri Light" panose="020F0302020204030204" pitchFamily="34" charset="0"/>
-                        </a:rPr>
-                        <m:t>𝐴𝑔</m:t>
-                      </m:r>
-                      <m:sSub>
-                        <m:sSubPr>
-                          <m:ctrlPr>
-                            <a:rPr lang="en-US" sz="2400" b="0" i="1" smtClean="0">
-                              <a:solidFill>
-                                <a:schemeClr val="tx1"/>
-                              </a:solidFill>
-                              <a:latin typeface="Cambria Math" panose="02040503050406030204" pitchFamily="18" charset="0"/>
-                              <a:cs typeface="Calibri Light" panose="020F0302020204030204" pitchFamily="34" charset="0"/>
-                            </a:rPr>
-                          </m:ctrlPr>
-                        </m:sSubPr>
-                        <m:e>
-                          <m:r>
-                            <a:rPr lang="en-US" sz="2400" b="0" i="1" smtClean="0">
-                              <a:solidFill>
-                                <a:schemeClr val="tx1"/>
-                              </a:solidFill>
-                              <a:latin typeface="Cambria Math" panose="02040503050406030204" pitchFamily="18" charset="0"/>
-                              <a:cs typeface="Calibri Light" panose="020F0302020204030204" pitchFamily="34" charset="0"/>
-                            </a:rPr>
-                            <m:t>𝑒</m:t>
-                          </m:r>
-                        </m:e>
-                        <m:sub>
-                          <m:r>
-                            <a:rPr lang="en-US" sz="2400" b="0" i="1" smtClean="0">
-                              <a:solidFill>
-                                <a:schemeClr val="tx1"/>
-                              </a:solidFill>
-                              <a:latin typeface="Cambria Math" panose="02040503050406030204" pitchFamily="18" charset="0"/>
-                              <a:cs typeface="Calibri Light" panose="020F0302020204030204" pitchFamily="34" charset="0"/>
-                            </a:rPr>
-                            <m:t>𝑖𝑡</m:t>
-                          </m:r>
-                        </m:sub>
-                      </m:sSub>
-                      <m:r>
-                        <a:rPr lang="en-US" sz="2400" b="0" i="1" smtClean="0">
-                          <a:solidFill>
-                            <a:schemeClr val="tx1"/>
-                          </a:solidFill>
-                          <a:latin typeface="Cambria Math" panose="02040503050406030204" pitchFamily="18" charset="0"/>
-                          <a:cs typeface="Calibri Light" panose="020F0302020204030204" pitchFamily="34" charset="0"/>
-                        </a:rPr>
-                        <m:t>+</m:t>
-                      </m:r>
-                      <m:sSub>
-                        <m:sSubPr>
-                          <m:ctrlPr>
-                            <a:rPr lang="en-US" sz="2400" b="0" i="1" smtClean="0">
-                              <a:solidFill>
-                                <a:schemeClr val="tx1"/>
-                              </a:solidFill>
-                              <a:latin typeface="Cambria Math" panose="02040503050406030204" pitchFamily="18" charset="0"/>
-                              <a:cs typeface="Calibri Light" panose="020F0302020204030204" pitchFamily="34" charset="0"/>
-                            </a:rPr>
-                          </m:ctrlPr>
-                        </m:sSubPr>
-                        <m:e>
-                          <m:r>
-                            <a:rPr lang="en-US" sz="2400" b="0" i="1" smtClean="0">
-                              <a:solidFill>
-                                <a:schemeClr val="tx1"/>
-                              </a:solidFill>
-                              <a:latin typeface="Cambria Math" panose="02040503050406030204" pitchFamily="18" charset="0"/>
-                              <a:cs typeface="Calibri Light" panose="020F0302020204030204" pitchFamily="34" charset="0"/>
-                            </a:rPr>
-                            <m:t>𝛽</m:t>
-                          </m:r>
-                        </m:e>
-                        <m:sub>
-                          <m:r>
-                            <a:rPr lang="en-US" sz="2400" b="0" i="1" smtClean="0">
-                              <a:solidFill>
-                                <a:schemeClr val="tx1"/>
-                              </a:solidFill>
-                              <a:latin typeface="Cambria Math" panose="02040503050406030204" pitchFamily="18" charset="0"/>
-                              <a:cs typeface="Calibri Light" panose="020F0302020204030204" pitchFamily="34" charset="0"/>
-                            </a:rPr>
-                            <m:t>2</m:t>
-                          </m:r>
-                        </m:sub>
-                      </m:sSub>
-                      <m:sSub>
-                        <m:sSubPr>
-                          <m:ctrlPr>
-                            <a:rPr lang="en-US" sz="2400" b="0" i="1" smtClean="0">
-                              <a:solidFill>
-                                <a:schemeClr val="tx1"/>
-                              </a:solidFill>
-                              <a:latin typeface="Cambria Math" panose="02040503050406030204" pitchFamily="18" charset="0"/>
-                              <a:cs typeface="Calibri Light" panose="020F0302020204030204" pitchFamily="34" charset="0"/>
-                            </a:rPr>
-                          </m:ctrlPr>
-                        </m:sSubPr>
-                        <m:e>
-                          <m:func>
-                            <m:funcPr>
-                              <m:ctrlPr>
-                                <a:rPr lang="en-US" sz="2400" b="0" i="1" smtClean="0">
-                                  <a:solidFill>
-                                    <a:schemeClr val="tx1"/>
-                                  </a:solidFill>
-                                  <a:latin typeface="Cambria Math" panose="02040503050406030204" pitchFamily="18" charset="0"/>
-                                  <a:cs typeface="Calibri Light" panose="020F0302020204030204" pitchFamily="34" charset="0"/>
-                                </a:rPr>
-                              </m:ctrlPr>
-                            </m:funcPr>
-                            <m:fName>
-                              <m:r>
-                                <m:rPr>
-                                  <m:sty m:val="p"/>
-                                </m:rPr>
-                                <a:rPr lang="en-US" sz="2400" b="0" i="0" smtClean="0">
-                                  <a:solidFill>
-                                    <a:schemeClr val="tx1"/>
-                                  </a:solidFill>
-                                  <a:latin typeface="Cambria Math" panose="02040503050406030204" pitchFamily="18" charset="0"/>
-                                  <a:cs typeface="Calibri Light" panose="020F0302020204030204" pitchFamily="34" charset="0"/>
-                                </a:rPr>
-                                <m:t>log</m:t>
-                              </m:r>
-                            </m:fName>
-                            <m:e>
-                              <m:d>
-                                <m:dPr>
-                                  <m:ctrlPr>
-                                    <a:rPr lang="en-US" sz="2400" b="0" i="1" smtClean="0">
-                                      <a:solidFill>
-                                        <a:schemeClr val="tx1"/>
-                                      </a:solidFill>
-                                      <a:latin typeface="Cambria Math" panose="02040503050406030204" pitchFamily="18" charset="0"/>
-                                      <a:cs typeface="Calibri Light" panose="020F0302020204030204" pitchFamily="34" charset="0"/>
-                                    </a:rPr>
-                                  </m:ctrlPr>
-                                </m:dPr>
-                                <m:e>
-                                  <m:r>
-                                    <a:rPr lang="en-US" sz="2400" b="0" i="1" smtClean="0">
-                                      <a:solidFill>
-                                        <a:schemeClr val="tx1"/>
-                                      </a:solidFill>
-                                      <a:latin typeface="Cambria Math" panose="02040503050406030204" pitchFamily="18" charset="0"/>
-                                      <a:cs typeface="Calibri Light" panose="020F0302020204030204" pitchFamily="34" charset="0"/>
-                                    </a:rPr>
-                                    <m:t>𝑊𝑄</m:t>
-                                  </m:r>
-                                </m:e>
-                              </m:d>
-                            </m:e>
-                          </m:func>
-                        </m:e>
-                        <m:sub>
-                          <m:r>
-                            <a:rPr lang="en-US" sz="2400" b="0" i="1" smtClean="0">
-                              <a:solidFill>
-                                <a:schemeClr val="tx1"/>
-                              </a:solidFill>
-                              <a:latin typeface="Cambria Math" panose="02040503050406030204" pitchFamily="18" charset="0"/>
-                              <a:cs typeface="Calibri Light" panose="020F0302020204030204" pitchFamily="34" charset="0"/>
-                            </a:rPr>
-                            <m:t>𝑖𝑡</m:t>
-                          </m:r>
-                        </m:sub>
-                      </m:sSub>
-                      <m:r>
-                        <a:rPr lang="en-US" sz="2400" b="0" i="1" smtClean="0">
-                          <a:solidFill>
-                            <a:schemeClr val="tx1"/>
-                          </a:solidFill>
-                          <a:latin typeface="Cambria Math" panose="02040503050406030204" pitchFamily="18" charset="0"/>
-                          <a:cs typeface="Calibri Light" panose="020F0302020204030204" pitchFamily="34" charset="0"/>
-                        </a:rPr>
-                        <m:t>+</m:t>
-                      </m:r>
-                      <m:sSub>
-                        <m:sSubPr>
-                          <m:ctrlPr>
-                            <a:rPr lang="en-US" sz="2400" b="0" i="1" smtClean="0">
-                              <a:solidFill>
-                                <a:schemeClr val="tx1"/>
-                              </a:solidFill>
-                              <a:latin typeface="Cambria Math" panose="02040503050406030204" pitchFamily="18" charset="0"/>
-                              <a:cs typeface="Calibri Light" panose="020F0302020204030204" pitchFamily="34" charset="0"/>
-                            </a:rPr>
-                          </m:ctrlPr>
-                        </m:sSubPr>
-                        <m:e>
-                          <m:r>
-                            <a:rPr lang="en-US" sz="2400" b="0" i="1" smtClean="0">
-                              <a:solidFill>
-                                <a:schemeClr val="tx1"/>
-                              </a:solidFill>
-                              <a:latin typeface="Cambria Math" panose="02040503050406030204" pitchFamily="18" charset="0"/>
-                              <a:cs typeface="Calibri Light" panose="020F0302020204030204" pitchFamily="34" charset="0"/>
-                            </a:rPr>
-                            <m:t>𝛽</m:t>
-                          </m:r>
-                        </m:e>
-                        <m:sub>
-                          <m:r>
-                            <a:rPr lang="en-US" sz="2400" b="0" i="1" smtClean="0">
-                              <a:solidFill>
-                                <a:schemeClr val="tx1"/>
-                              </a:solidFill>
-                              <a:latin typeface="Cambria Math" panose="02040503050406030204" pitchFamily="18" charset="0"/>
-                              <a:cs typeface="Calibri Light" panose="020F0302020204030204" pitchFamily="34" charset="0"/>
-                            </a:rPr>
-                            <m:t>3</m:t>
-                          </m:r>
-                        </m:sub>
-                      </m:sSub>
-                      <m:sSub>
-                        <m:sSubPr>
-                          <m:ctrlPr>
-                            <a:rPr lang="en-US" sz="2400" b="0" i="1" smtClean="0">
-                              <a:solidFill>
-                                <a:schemeClr val="tx1"/>
-                              </a:solidFill>
-                              <a:latin typeface="Cambria Math" panose="02040503050406030204" pitchFamily="18" charset="0"/>
-                              <a:cs typeface="Calibri Light" panose="020F0302020204030204" pitchFamily="34" charset="0"/>
-                            </a:rPr>
-                          </m:ctrlPr>
-                        </m:sSubPr>
-                        <m:e>
-                          <m:acc>
-                            <m:accPr>
-                              <m:chr m:val="̂"/>
-                              <m:ctrlPr>
-                                <a:rPr lang="en-US" sz="2400" b="0" i="1" smtClean="0">
-                                  <a:solidFill>
-                                    <a:schemeClr val="tx1"/>
-                                  </a:solidFill>
-                                  <a:latin typeface="Cambria Math" panose="02040503050406030204" pitchFamily="18" charset="0"/>
-                                  <a:cs typeface="Calibri Light" panose="020F0302020204030204" pitchFamily="34" charset="0"/>
-                                </a:rPr>
-                              </m:ctrlPr>
-                            </m:accPr>
-                            <m:e>
-                              <m:r>
-                                <a:rPr lang="en-US" sz="2400" b="0" i="1" smtClean="0">
-                                  <a:solidFill>
-                                    <a:schemeClr val="tx1"/>
-                                  </a:solidFill>
-                                  <a:latin typeface="Cambria Math" panose="02040503050406030204" pitchFamily="18" charset="0"/>
-                                  <a:cs typeface="Calibri Light" panose="020F0302020204030204" pitchFamily="34" charset="0"/>
-                                </a:rPr>
-                                <m:t>𝐸𝐶</m:t>
-                              </m:r>
-                              <m:r>
-                                <a:rPr lang="en-US" sz="2400" b="0" i="1" smtClean="0">
-                                  <a:solidFill>
-                                    <a:schemeClr val="tx1"/>
-                                  </a:solidFill>
-                                  <a:latin typeface="Cambria Math" panose="02040503050406030204" pitchFamily="18" charset="0"/>
-                                  <a:cs typeface="Calibri Light" panose="020F0302020204030204" pitchFamily="34" charset="0"/>
-                                </a:rPr>
-                                <m:t>𝑆</m:t>
-                              </m:r>
-                            </m:e>
-                          </m:acc>
-                        </m:e>
-                        <m:sub>
-                          <m:r>
-                            <a:rPr lang="en-US" sz="2400" b="0" i="1" smtClean="0">
-                              <a:solidFill>
-                                <a:schemeClr val="tx1"/>
-                              </a:solidFill>
-                              <a:latin typeface="Cambria Math" panose="02040503050406030204" pitchFamily="18" charset="0"/>
-                              <a:cs typeface="Calibri Light" panose="020F0302020204030204" pitchFamily="34" charset="0"/>
-                            </a:rPr>
-                            <m:t>𝑗𝑡</m:t>
-                          </m:r>
-                        </m:sub>
-                      </m:sSub>
-                      <m:r>
-                        <a:rPr lang="en-US" sz="2400" b="0" i="1" smtClean="0">
-                          <a:solidFill>
-                            <a:schemeClr val="tx1"/>
-                          </a:solidFill>
-                          <a:latin typeface="Cambria Math" panose="02040503050406030204" pitchFamily="18" charset="0"/>
-                          <a:cs typeface="Calibri Light" panose="020F0302020204030204" pitchFamily="34" charset="0"/>
-                        </a:rPr>
-                        <m:t>+</m:t>
-                      </m:r>
-                      <m:sSub>
-                        <m:sSubPr>
-                          <m:ctrlPr>
-                            <a:rPr lang="en-US" sz="2400" b="0" i="1" smtClean="0">
-                              <a:solidFill>
-                                <a:schemeClr val="tx1"/>
-                              </a:solidFill>
-                              <a:latin typeface="Cambria Math" panose="02040503050406030204" pitchFamily="18" charset="0"/>
-                              <a:cs typeface="Calibri Light" panose="020F0302020204030204" pitchFamily="34" charset="0"/>
-                            </a:rPr>
-                          </m:ctrlPr>
-                        </m:sSubPr>
-                        <m:e>
-                          <m:r>
-                            <a:rPr lang="en-US" sz="2400" b="0" i="1" smtClean="0">
-                              <a:solidFill>
-                                <a:schemeClr val="tx1"/>
-                              </a:solidFill>
-                              <a:latin typeface="Cambria Math" panose="02040503050406030204" pitchFamily="18" charset="0"/>
-                              <a:cs typeface="Calibri Light" panose="020F0302020204030204" pitchFamily="34" charset="0"/>
-                            </a:rPr>
-                            <m:t>𝛼</m:t>
-                          </m:r>
-                        </m:e>
-                        <m:sub>
-                          <m:r>
-                            <a:rPr lang="en-US" sz="2400" b="0" i="1" smtClean="0">
-                              <a:solidFill>
-                                <a:schemeClr val="tx1"/>
-                              </a:solidFill>
-                              <a:latin typeface="Cambria Math" panose="02040503050406030204" pitchFamily="18" charset="0"/>
-                              <a:cs typeface="Calibri Light" panose="020F0302020204030204" pitchFamily="34" charset="0"/>
-                            </a:rPr>
-                            <m:t>𝑖</m:t>
-                          </m:r>
-                        </m:sub>
-                      </m:sSub>
-                      <m:r>
-                        <a:rPr lang="en-US" sz="2400" b="0" i="1" smtClean="0">
-                          <a:solidFill>
-                            <a:schemeClr val="tx1"/>
-                          </a:solidFill>
-                          <a:latin typeface="Cambria Math" panose="02040503050406030204" pitchFamily="18" charset="0"/>
-                          <a:cs typeface="Calibri Light" panose="020F0302020204030204" pitchFamily="34" charset="0"/>
-                        </a:rPr>
-                        <m:t>+</m:t>
-                      </m:r>
-                      <m:sSub>
-                        <m:sSubPr>
-                          <m:ctrlPr>
-                            <a:rPr lang="en-US" sz="2400" b="0" i="1" smtClean="0">
-                              <a:solidFill>
-                                <a:schemeClr val="tx1"/>
-                              </a:solidFill>
-                              <a:latin typeface="Cambria Math" panose="02040503050406030204" pitchFamily="18" charset="0"/>
-                              <a:cs typeface="Calibri Light" panose="020F0302020204030204" pitchFamily="34" charset="0"/>
-                            </a:rPr>
-                          </m:ctrlPr>
-                        </m:sSubPr>
-                        <m:e>
-                          <m:r>
-                            <a:rPr lang="en-US" sz="2400" b="0" i="1" smtClean="0">
-                              <a:solidFill>
-                                <a:schemeClr val="tx1"/>
-                              </a:solidFill>
-                              <a:latin typeface="Cambria Math" panose="02040503050406030204" pitchFamily="18" charset="0"/>
-                              <a:cs typeface="Calibri Light" panose="020F0302020204030204" pitchFamily="34" charset="0"/>
-                            </a:rPr>
-                            <m:t>𝛾</m:t>
-                          </m:r>
-                        </m:e>
-                        <m:sub>
-                          <m:r>
-                            <a:rPr lang="en-US" sz="2400" b="0" i="1" smtClean="0">
-                              <a:solidFill>
-                                <a:schemeClr val="tx1"/>
-                              </a:solidFill>
-                              <a:latin typeface="Cambria Math" panose="02040503050406030204" pitchFamily="18" charset="0"/>
-                              <a:cs typeface="Calibri Light" panose="020F0302020204030204" pitchFamily="34" charset="0"/>
-                            </a:rPr>
-                            <m:t>𝑡</m:t>
-                          </m:r>
-                        </m:sub>
-                      </m:sSub>
-                      <m:r>
-                        <a:rPr lang="en-US" sz="2400" b="0" i="1" smtClean="0">
-                          <a:solidFill>
-                            <a:schemeClr val="tx1"/>
-                          </a:solidFill>
-                          <a:latin typeface="Cambria Math" panose="02040503050406030204" pitchFamily="18" charset="0"/>
-                          <a:cs typeface="Calibri Light" panose="020F0302020204030204" pitchFamily="34" charset="0"/>
-                        </a:rPr>
-                        <m:t>+</m:t>
-                      </m:r>
-                      <m:sSub>
-                        <m:sSubPr>
-                          <m:ctrlPr>
-                            <a:rPr lang="en-US" sz="2400" b="0" i="1" smtClean="0">
-                              <a:solidFill>
-                                <a:schemeClr val="tx1"/>
-                              </a:solidFill>
-                              <a:latin typeface="Cambria Math" panose="02040503050406030204" pitchFamily="18" charset="0"/>
-                              <a:cs typeface="Calibri Light" panose="020F0302020204030204" pitchFamily="34" charset="0"/>
-                            </a:rPr>
-                          </m:ctrlPr>
-                        </m:sSubPr>
-                        <m:e>
-                          <m:r>
-                            <a:rPr lang="en-US" sz="2400" b="0" i="1" smtClean="0">
-                              <a:solidFill>
-                                <a:schemeClr val="tx1"/>
-                              </a:solidFill>
-                              <a:latin typeface="Cambria Math" panose="02040503050406030204" pitchFamily="18" charset="0"/>
-                              <a:cs typeface="Calibri Light" panose="020F0302020204030204" pitchFamily="34" charset="0"/>
-                            </a:rPr>
-                            <m:t>𝜔</m:t>
-                          </m:r>
-                        </m:e>
-                        <m:sub>
-                          <m:r>
-                            <a:rPr lang="en-US" sz="2400" b="0" i="1" smtClean="0">
-                              <a:solidFill>
-                                <a:schemeClr val="tx1"/>
-                              </a:solidFill>
-                              <a:latin typeface="Cambria Math" panose="02040503050406030204" pitchFamily="18" charset="0"/>
-                              <a:cs typeface="Calibri Light" panose="020F0302020204030204" pitchFamily="34" charset="0"/>
-                            </a:rPr>
-                            <m:t>𝑚</m:t>
-                          </m:r>
-                        </m:sub>
-                      </m:sSub>
-                      <m:r>
-                        <a:rPr lang="en-US" sz="2400" b="0" i="1" smtClean="0">
-                          <a:solidFill>
-                            <a:schemeClr val="tx1"/>
-                          </a:solidFill>
-                          <a:latin typeface="Cambria Math" panose="02040503050406030204" pitchFamily="18" charset="0"/>
-                          <a:cs typeface="Calibri Light" panose="020F0302020204030204" pitchFamily="34" charset="0"/>
-                        </a:rPr>
-                        <m:t>+</m:t>
-                      </m:r>
-                      <m:sSub>
-                        <m:sSubPr>
-                          <m:ctrlPr>
-                            <a:rPr lang="en-US" sz="2400" b="0" i="1" smtClean="0">
-                              <a:solidFill>
-                                <a:schemeClr val="tx1"/>
-                              </a:solidFill>
-                              <a:latin typeface="Cambria Math" panose="02040503050406030204" pitchFamily="18" charset="0"/>
-                              <a:cs typeface="Calibri Light" panose="020F0302020204030204" pitchFamily="34" charset="0"/>
-                            </a:rPr>
-                          </m:ctrlPr>
-                        </m:sSubPr>
-                        <m:e>
-                          <m:r>
-                            <a:rPr lang="en-US" sz="2400" b="0" i="1" smtClean="0">
-                              <a:solidFill>
-                                <a:schemeClr val="tx1"/>
-                              </a:solidFill>
-                              <a:latin typeface="Cambria Math" panose="02040503050406030204" pitchFamily="18" charset="0"/>
-                              <a:cs typeface="Calibri Light" panose="020F0302020204030204" pitchFamily="34" charset="0"/>
-                            </a:rPr>
-                            <m:t>𝜀</m:t>
-                          </m:r>
-                        </m:e>
-                        <m:sub>
-                          <m:r>
-                            <a:rPr lang="en-US" sz="2400" b="0" i="1" smtClean="0">
-                              <a:solidFill>
-                                <a:schemeClr val="tx1"/>
-                              </a:solidFill>
-                              <a:latin typeface="Cambria Math" panose="02040503050406030204" pitchFamily="18" charset="0"/>
-                              <a:cs typeface="Calibri Light" panose="020F0302020204030204" pitchFamily="34" charset="0"/>
-                            </a:rPr>
-                            <m:t>𝑖𝑗𝑡</m:t>
-                          </m:r>
-                        </m:sub>
-                      </m:sSub>
-                    </m:oMath>
-                  </m:oMathPara>
-                </a14:m>
-                <a:endParaRPr lang="en-US" sz="2400" dirty="0">
-                  <a:solidFill>
-                    <a:schemeClr val="tx1"/>
-                  </a:solidFill>
-                  <a:latin typeface="+mj-lt"/>
-                  <a:cs typeface="Calibri Light" panose="020F0302020204030204" pitchFamily="34" charset="0"/>
-                </a:endParaRPr>
-              </a:p>
-              <a:p>
-                <a:pPr lvl="1"/>
-                <a:endParaRPr lang="en-US" sz="2400" dirty="0">
-                  <a:latin typeface="+mj-lt"/>
-                  <a:cs typeface="Calibri Light" panose="020F0302020204030204" pitchFamily="34" charset="0"/>
-                </a:endParaRPr>
-              </a:p>
-            </p:txBody>
-          </p:sp>
-        </mc:Choice>
-        <mc:Fallback>
-          <p:sp>
-            <p:nvSpPr>
-              <p:cNvPr id="10" name="TextBox 9">
-                <a:extLst>
-                  <a:ext uri="{FF2B5EF4-FFF2-40B4-BE49-F238E27FC236}">
-                    <a16:creationId xmlns:a16="http://schemas.microsoft.com/office/drawing/2014/main" id="{E863E88C-22ED-47CC-B17C-6B97A3611646}"/>
-                  </a:ext>
-                </a:extLst>
-              </p:cNvPr>
-              <p:cNvSpPr txBox="1">
-                <a:spLocks noRot="1" noChangeAspect="1" noMove="1" noResize="1" noEditPoints="1" noAdjustHandles="1" noChangeArrowheads="1" noChangeShapeType="1" noTextEdit="1"/>
-              </p:cNvSpPr>
-              <p:nvPr/>
-            </p:nvSpPr>
-            <p:spPr>
-              <a:xfrm>
-                <a:off x="305663" y="1065214"/>
-                <a:ext cx="11580669" cy="881332"/>
-              </a:xfrm>
-              <a:prstGeom prst="rect">
-                <a:avLst/>
-              </a:prstGeom>
-              <a:blipFill>
-                <a:blip r:embed="rId4"/>
-                <a:stretch>
-                  <a:fillRect/>
-                </a:stretch>
-              </a:blipFill>
-              <a:effectLst/>
-            </p:spPr>
-            <p:txBody>
-              <a:bodyPr/>
-              <a:lstStyle/>
-              <a:p>
-                <a:r>
-                  <a:rPr lang="en-US">
-                    <a:noFill/>
-                  </a:rPr>
-                  <a:t> </a:t>
-                </a:r>
-              </a:p>
-            </p:txBody>
-          </p:sp>
-        </mc:Fallback>
-      </mc:AlternateContent>
-      <p:sp>
-        <p:nvSpPr>
-          <p:cNvPr id="6" name="Title 2">
-            <a:extLst>
-              <a:ext uri="{FF2B5EF4-FFF2-40B4-BE49-F238E27FC236}">
-                <a16:creationId xmlns:a16="http://schemas.microsoft.com/office/drawing/2014/main" id="{62886FA5-F147-476F-962C-F8F29C058435}"/>
-              </a:ext>
-            </a:extLst>
-          </p:cNvPr>
-          <p:cNvSpPr txBox="1">
-            <a:spLocks/>
-          </p:cNvSpPr>
-          <p:nvPr/>
-        </p:nvSpPr>
-        <p:spPr>
-          <a:xfrm>
-            <a:off x="1921485" y="0"/>
-            <a:ext cx="8349027" cy="898595"/>
-          </a:xfrm>
-          <a:prstGeom prst="rect">
-            <a:avLst/>
-          </a:prstGeom>
-        </p:spPr>
-        <p:txBody>
-          <a:bodyPr vert="horz" lIns="91440" tIns="45720" rIns="91440" bIns="45720" rtlCol="0" anchor="b">
-            <a:normAutofit/>
-          </a:bodyPr>
-          <a:lstStyle>
-            <a:lvl1pPr algn="l" defTabSz="914400" rtl="0" eaLnBrk="1" latinLnBrk="0" hangingPunct="1">
-              <a:lnSpc>
-                <a:spcPct val="85000"/>
-              </a:lnSpc>
-              <a:spcBef>
-                <a:spcPct val="0"/>
-              </a:spcBef>
-              <a:buNone/>
-              <a:defRPr sz="2400" kern="1200" spc="-50" baseline="0">
-                <a:solidFill>
-                  <a:schemeClr val="tx1">
-                    <a:lumMod val="75000"/>
-                    <a:lumOff val="25000"/>
-                  </a:schemeClr>
-                </a:solidFill>
-                <a:latin typeface="Times New Roman" panose="02020603050405020304" pitchFamily="18" charset="0"/>
-                <a:ea typeface="+mj-ea"/>
-                <a:cs typeface="Times New Roman" panose="02020603050405020304" pitchFamily="18" charset="0"/>
-              </a:defRPr>
-            </a:lvl1pPr>
-          </a:lstStyle>
-          <a:p>
-            <a:pPr algn="ctr"/>
-            <a:r>
-              <a:rPr lang="en-US" sz="4000" dirty="0">
-                <a:solidFill>
-                  <a:schemeClr val="tx1"/>
-                </a:solidFill>
-                <a:latin typeface="+mj-lt"/>
-              </a:rPr>
-              <a:t>The two-stage model </a:t>
-            </a:r>
-          </a:p>
-        </p:txBody>
-      </p:sp>
-    </p:spTree>
-    <p:custDataLst>
-      <p:tags r:id="rId1"/>
-    </p:custDataLst>
-    <p:extLst>
-      <p:ext uri="{BB962C8B-B14F-4D97-AF65-F5344CB8AC3E}">
-        <p14:creationId xmlns:p14="http://schemas.microsoft.com/office/powerpoint/2010/main" val="3834300132"/>
-      </p:ext>
-    </p:extLst>
-  </p:cSld>
-  <p:clrMapOvr>
-    <a:masterClrMapping/>
-  </p:clrMapOvr>
-</p:sld>
-</file>
-
-<file path=ppt/slides/slide23.xml><?xml version="1.0" encoding="utf-8"?>
-<p:sld xmlns:a="http://schemas.openxmlformats.org/drawingml/2006/main" xmlns:r="http://schemas.openxmlformats.org/officeDocument/2006/relationships" xmlns:p="http://schemas.openxmlformats.org/presentationml/2006/main">
-  <p:cSld>
-    <p:spTree>
-      <p:nvGrpSpPr>
-        <p:cNvPr id="1" name=""/>
-        <p:cNvGrpSpPr/>
-        <p:nvPr/>
-      </p:nvGrpSpPr>
-      <p:grpSpPr>
-        <a:xfrm>
-          <a:off x="0" y="0"/>
-          <a:ext cx="0" cy="0"/>
-          <a:chOff x="0" y="0"/>
-          <a:chExt cx="0" cy="0"/>
-        </a:xfrm>
-      </p:grpSpPr>
-      <mc:AlternateContent xmlns:mc="http://schemas.openxmlformats.org/markup-compatibility/2006">
-        <mc:Choice xmlns:a14="http://schemas.microsoft.com/office/drawing/2010/main" Requires="a14">
+      <mc:AlternateContent xmlns:mc="http://schemas.openxmlformats.org/markup-compatibility/2006" xmlns:a14="http://schemas.microsoft.com/office/drawing/2010/main">
+        <mc:Choice Requires="a14">
           <p:sp>
             <p:nvSpPr>
               <p:cNvPr id="10" name="TextBox 9">
@@ -25224,7 +24373,7 @@
             </p:txBody>
           </p:sp>
         </mc:Choice>
-        <mc:Fallback>
+        <mc:Fallback xmlns="">
           <p:sp>
             <p:nvSpPr>
               <p:cNvPr id="10" name="TextBox 9">
@@ -25333,65 +24482,13 @@
           </a:p>
         </p:txBody>
       </p:sp>
-      <p:sp>
-        <p:nvSpPr>
-          <p:cNvPr id="4" name="Rectangle: Rounded Corners 3">
-            <a:extLst>
-              <a:ext uri="{FF2B5EF4-FFF2-40B4-BE49-F238E27FC236}">
-                <a16:creationId xmlns:a16="http://schemas.microsoft.com/office/drawing/2014/main" id="{16D15CCF-AE49-4317-A9EA-5128176920E5}"/>
-              </a:ext>
-            </a:extLst>
-          </p:cNvPr>
-          <p:cNvSpPr/>
-          <p:nvPr/>
-        </p:nvSpPr>
-        <p:spPr>
-          <a:xfrm>
-            <a:off x="6942566" y="1065214"/>
-            <a:ext cx="1227073" cy="510459"/>
-          </a:xfrm>
-          <a:prstGeom prst="roundRect">
-            <a:avLst/>
-          </a:prstGeom>
-          <a:noFill/>
-          <a:ln w="28575">
-            <a:solidFill>
-              <a:srgbClr val="C00000"/>
-            </a:solidFill>
-          </a:ln>
-        </p:spPr>
-        <p:style>
-          <a:lnRef idx="2">
-            <a:schemeClr val="accent1">
-              <a:shade val="50000"/>
-            </a:schemeClr>
-          </a:lnRef>
-          <a:fillRef idx="1">
-            <a:schemeClr val="accent1"/>
-          </a:fillRef>
-          <a:effectRef idx="0">
-            <a:schemeClr val="accent1"/>
-          </a:effectRef>
-          <a:fontRef idx="minor">
-            <a:schemeClr val="lt1"/>
-          </a:fontRef>
-        </p:style>
-        <p:txBody>
-          <a:bodyPr rtlCol="0" anchor="ctr"/>
-          <a:lstStyle/>
-          <a:p>
-            <a:pPr algn="ctr"/>
-            <a:endParaRPr lang="en-US"/>
-          </a:p>
-        </p:txBody>
-      </p:sp>
     </p:spTree>
     <p:custDataLst>
       <p:tags r:id="rId1"/>
     </p:custDataLst>
     <p:extLst>
       <p:ext uri="{BB962C8B-B14F-4D97-AF65-F5344CB8AC3E}">
-        <p14:creationId xmlns:p14="http://schemas.microsoft.com/office/powerpoint/2010/main" val="1623257099"/>
+        <p14:creationId xmlns:p14="http://schemas.microsoft.com/office/powerpoint/2010/main" val="3834300132"/>
       </p:ext>
     </p:extLst>
   </p:cSld>
@@ -25401,7 +24498,7 @@
 </p:sld>
 </file>
 
-<file path=ppt/slides/slide24.xml><?xml version="1.0" encoding="utf-8"?>
+<file path=ppt/slides/slide23.xml><?xml version="1.0" encoding="utf-8"?>
 <p:sld xmlns:a="http://schemas.openxmlformats.org/drawingml/2006/main" xmlns:r="http://schemas.openxmlformats.org/officeDocument/2006/relationships" xmlns:p="http://schemas.openxmlformats.org/presentationml/2006/main">
   <p:cSld>
     <p:spTree>
@@ -25418,8 +24515,8 @@
           <a:chExt cx="0" cy="0"/>
         </a:xfrm>
       </p:grpSpPr>
-      <mc:AlternateContent xmlns:mc="http://schemas.openxmlformats.org/markup-compatibility/2006">
-        <mc:Choice xmlns:a14="http://schemas.microsoft.com/office/drawing/2010/main" Requires="a14">
+      <mc:AlternateContent xmlns:mc="http://schemas.openxmlformats.org/markup-compatibility/2006" xmlns:a14="http://schemas.microsoft.com/office/drawing/2010/main">
+        <mc:Choice Requires="a14">
           <p:sp>
             <p:nvSpPr>
               <p:cNvPr id="10" name="TextBox 9">
@@ -26117,7 +25214,900 @@
             </p:txBody>
           </p:sp>
         </mc:Choice>
-        <mc:Fallback>
+        <mc:Fallback xmlns="">
+          <p:sp>
+            <p:nvSpPr>
+              <p:cNvPr id="10" name="TextBox 9">
+                <a:extLst>
+                  <a:ext uri="{FF2B5EF4-FFF2-40B4-BE49-F238E27FC236}">
+                    <a16:creationId xmlns:a16="http://schemas.microsoft.com/office/drawing/2014/main" id="{E863E88C-22ED-47CC-B17C-6B97A3611646}"/>
+                  </a:ext>
+                </a:extLst>
+              </p:cNvPr>
+              <p:cNvSpPr txBox="1">
+                <a:spLocks noRot="1" noChangeAspect="1" noMove="1" noResize="1" noEditPoints="1" noAdjustHandles="1" noChangeArrowheads="1" noChangeShapeType="1" noTextEdit="1"/>
+              </p:cNvSpPr>
+              <p:nvPr/>
+            </p:nvSpPr>
+            <p:spPr>
+              <a:xfrm>
+                <a:off x="305663" y="1065214"/>
+                <a:ext cx="11580669" cy="881332"/>
+              </a:xfrm>
+              <a:prstGeom prst="rect">
+                <a:avLst/>
+              </a:prstGeom>
+              <a:blipFill>
+                <a:blip r:embed="rId4"/>
+                <a:stretch>
+                  <a:fillRect/>
+                </a:stretch>
+              </a:blipFill>
+              <a:effectLst/>
+            </p:spPr>
+            <p:txBody>
+              <a:bodyPr/>
+              <a:lstStyle/>
+              <a:p>
+                <a:r>
+                  <a:rPr lang="en-US">
+                    <a:noFill/>
+                  </a:rPr>
+                  <a:t> </a:t>
+                </a:r>
+              </a:p>
+            </p:txBody>
+          </p:sp>
+        </mc:Fallback>
+      </mc:AlternateContent>
+      <p:sp>
+        <p:nvSpPr>
+          <p:cNvPr id="6" name="Title 2">
+            <a:extLst>
+              <a:ext uri="{FF2B5EF4-FFF2-40B4-BE49-F238E27FC236}">
+                <a16:creationId xmlns:a16="http://schemas.microsoft.com/office/drawing/2014/main" id="{62886FA5-F147-476F-962C-F8F29C058435}"/>
+              </a:ext>
+            </a:extLst>
+          </p:cNvPr>
+          <p:cNvSpPr txBox="1">
+            <a:spLocks/>
+          </p:cNvSpPr>
+          <p:nvPr/>
+        </p:nvSpPr>
+        <p:spPr>
+          <a:xfrm>
+            <a:off x="1921485" y="0"/>
+            <a:ext cx="8349027" cy="898595"/>
+          </a:xfrm>
+          <a:prstGeom prst="rect">
+            <a:avLst/>
+          </a:prstGeom>
+        </p:spPr>
+        <p:txBody>
+          <a:bodyPr vert="horz" lIns="91440" tIns="45720" rIns="91440" bIns="45720" rtlCol="0" anchor="b">
+            <a:normAutofit/>
+          </a:bodyPr>
+          <a:lstStyle>
+            <a:lvl1pPr algn="l" defTabSz="914400" rtl="0" eaLnBrk="1" latinLnBrk="0" hangingPunct="1">
+              <a:lnSpc>
+                <a:spcPct val="85000"/>
+              </a:lnSpc>
+              <a:spcBef>
+                <a:spcPct val="0"/>
+              </a:spcBef>
+              <a:buNone/>
+              <a:defRPr sz="2400" kern="1200" spc="-50" baseline="0">
+                <a:solidFill>
+                  <a:schemeClr val="tx1">
+                    <a:lumMod val="75000"/>
+                    <a:lumOff val="25000"/>
+                  </a:schemeClr>
+                </a:solidFill>
+                <a:latin typeface="Times New Roman" panose="02020603050405020304" pitchFamily="18" charset="0"/>
+                <a:ea typeface="+mj-ea"/>
+                <a:cs typeface="Times New Roman" panose="02020603050405020304" pitchFamily="18" charset="0"/>
+              </a:defRPr>
+            </a:lvl1pPr>
+          </a:lstStyle>
+          <a:p>
+            <a:pPr algn="ctr"/>
+            <a:r>
+              <a:rPr lang="en-US" sz="4000" dirty="0">
+                <a:solidFill>
+                  <a:schemeClr val="tx1"/>
+                </a:solidFill>
+                <a:latin typeface="+mj-lt"/>
+              </a:rPr>
+              <a:t>The two-stage model </a:t>
+            </a:r>
+          </a:p>
+        </p:txBody>
+      </p:sp>
+      <p:sp>
+        <p:nvSpPr>
+          <p:cNvPr id="4" name="Rectangle: Rounded Corners 3">
+            <a:extLst>
+              <a:ext uri="{FF2B5EF4-FFF2-40B4-BE49-F238E27FC236}">
+                <a16:creationId xmlns:a16="http://schemas.microsoft.com/office/drawing/2014/main" id="{16D15CCF-AE49-4317-A9EA-5128176920E5}"/>
+              </a:ext>
+            </a:extLst>
+          </p:cNvPr>
+          <p:cNvSpPr/>
+          <p:nvPr/>
+        </p:nvSpPr>
+        <p:spPr>
+          <a:xfrm>
+            <a:off x="6942566" y="1065214"/>
+            <a:ext cx="1227073" cy="510459"/>
+          </a:xfrm>
+          <a:prstGeom prst="roundRect">
+            <a:avLst/>
+          </a:prstGeom>
+          <a:noFill/>
+          <a:ln w="28575">
+            <a:solidFill>
+              <a:srgbClr val="C00000"/>
+            </a:solidFill>
+          </a:ln>
+        </p:spPr>
+        <p:style>
+          <a:lnRef idx="2">
+            <a:schemeClr val="accent1">
+              <a:shade val="50000"/>
+            </a:schemeClr>
+          </a:lnRef>
+          <a:fillRef idx="1">
+            <a:schemeClr val="accent1"/>
+          </a:fillRef>
+          <a:effectRef idx="0">
+            <a:schemeClr val="accent1"/>
+          </a:effectRef>
+          <a:fontRef idx="minor">
+            <a:schemeClr val="lt1"/>
+          </a:fontRef>
+        </p:style>
+        <p:txBody>
+          <a:bodyPr rtlCol="0" anchor="ctr"/>
+          <a:lstStyle/>
+          <a:p>
+            <a:pPr algn="ctr"/>
+            <a:endParaRPr lang="en-US"/>
+          </a:p>
+        </p:txBody>
+      </p:sp>
+    </p:spTree>
+    <p:custDataLst>
+      <p:tags r:id="rId1"/>
+    </p:custDataLst>
+    <p:extLst>
+      <p:ext uri="{BB962C8B-B14F-4D97-AF65-F5344CB8AC3E}">
+        <p14:creationId xmlns:p14="http://schemas.microsoft.com/office/powerpoint/2010/main" val="1623257099"/>
+      </p:ext>
+    </p:extLst>
+  </p:cSld>
+  <p:clrMapOvr>
+    <a:masterClrMapping/>
+  </p:clrMapOvr>
+</p:sld>
+</file>
+
+<file path=ppt/slides/slide24.xml><?xml version="1.0" encoding="utf-8"?>
+<p:sld xmlns:a="http://schemas.openxmlformats.org/drawingml/2006/main" xmlns:r="http://schemas.openxmlformats.org/officeDocument/2006/relationships" xmlns:p="http://schemas.openxmlformats.org/presentationml/2006/main">
+  <p:cSld>
+    <p:spTree>
+      <p:nvGrpSpPr>
+        <p:cNvPr id="1" name=""/>
+        <p:cNvGrpSpPr/>
+        <p:nvPr/>
+      </p:nvGrpSpPr>
+      <p:grpSpPr>
+        <a:xfrm>
+          <a:off x="0" y="0"/>
+          <a:ext cx="0" cy="0"/>
+          <a:chOff x="0" y="0"/>
+          <a:chExt cx="0" cy="0"/>
+        </a:xfrm>
+      </p:grpSpPr>
+      <mc:AlternateContent xmlns:mc="http://schemas.openxmlformats.org/markup-compatibility/2006" xmlns:a14="http://schemas.microsoft.com/office/drawing/2010/main">
+        <mc:Choice Requires="a14">
+          <p:sp>
+            <p:nvSpPr>
+              <p:cNvPr id="10" name="TextBox 9">
+                <a:extLst>
+                  <a:ext uri="{FF2B5EF4-FFF2-40B4-BE49-F238E27FC236}">
+                    <a16:creationId xmlns:a16="http://schemas.microsoft.com/office/drawing/2014/main" id="{E863E88C-22ED-47CC-B17C-6B97A3611646}"/>
+                  </a:ext>
+                </a:extLst>
+              </p:cNvPr>
+              <p:cNvSpPr txBox="1"/>
+              <p:nvPr/>
+            </p:nvSpPr>
+            <p:spPr>
+              <a:xfrm>
+                <a:off x="305663" y="1065214"/>
+                <a:ext cx="11580669" cy="881332"/>
+              </a:xfrm>
+              <a:prstGeom prst="rect">
+                <a:avLst/>
+              </a:prstGeom>
+              <a:noFill/>
+              <a:effectLst/>
+            </p:spPr>
+            <p:txBody>
+              <a:bodyPr wrap="square" rtlCol="0">
+                <a:spAutoFit/>
+              </a:bodyPr>
+              <a:lstStyle/>
+              <a:p>
+                <a:pPr lvl="1"/>
+                <a14:m>
+                  <m:oMathPara xmlns:m="http://schemas.openxmlformats.org/officeDocument/2006/math">
+                    <m:oMathParaPr>
+                      <m:jc m:val="centerGroup"/>
+                    </m:oMathParaPr>
+                    <m:oMath xmlns:m="http://schemas.openxmlformats.org/officeDocument/2006/math">
+                      <m:sSub>
+                        <m:sSubPr>
+                          <m:ctrlPr>
+                            <a:rPr lang="en-US" sz="2400" b="0" i="1" smtClean="0">
+                              <a:solidFill>
+                                <a:schemeClr val="tx1"/>
+                              </a:solidFill>
+                              <a:latin typeface="Cambria Math" panose="02040503050406030204" pitchFamily="18" charset="0"/>
+                              <a:cs typeface="Calibri Light" panose="020F0302020204030204" pitchFamily="34" charset="0"/>
+                            </a:rPr>
+                          </m:ctrlPr>
+                        </m:sSubPr>
+                        <m:e>
+                          <m:func>
+                            <m:funcPr>
+                              <m:ctrlPr>
+                                <a:rPr lang="en-US" sz="2400" b="0" i="1" smtClean="0">
+                                  <a:solidFill>
+                                    <a:schemeClr val="tx1"/>
+                                  </a:solidFill>
+                                  <a:latin typeface="Cambria Math" panose="02040503050406030204" pitchFamily="18" charset="0"/>
+                                  <a:cs typeface="Calibri Light" panose="020F0302020204030204" pitchFamily="34" charset="0"/>
+                                </a:rPr>
+                              </m:ctrlPr>
+                            </m:funcPr>
+                            <m:fName>
+                              <m:r>
+                                <m:rPr>
+                                  <m:sty m:val="p"/>
+                                </m:rPr>
+                                <a:rPr lang="en-US" sz="2400" b="0" i="0" smtClean="0">
+                                  <a:solidFill>
+                                    <a:schemeClr val="tx1"/>
+                                  </a:solidFill>
+                                  <a:latin typeface="Cambria Math" panose="02040503050406030204" pitchFamily="18" charset="0"/>
+                                  <a:cs typeface="Calibri Light" panose="020F0302020204030204" pitchFamily="34" charset="0"/>
+                                </a:rPr>
+                                <m:t>log</m:t>
+                              </m:r>
+                            </m:fName>
+                            <m:e>
+                              <m:d>
+                                <m:dPr>
+                                  <m:ctrlPr>
+                                    <a:rPr lang="en-US" sz="2400" b="0" i="1" smtClean="0">
+                                      <a:solidFill>
+                                        <a:schemeClr val="tx1"/>
+                                      </a:solidFill>
+                                      <a:latin typeface="Cambria Math" panose="02040503050406030204" pitchFamily="18" charset="0"/>
+                                      <a:cs typeface="Calibri Light" panose="020F0302020204030204" pitchFamily="34" charset="0"/>
+                                    </a:rPr>
+                                  </m:ctrlPr>
+                                </m:dPr>
+                                <m:e>
+                                  <m:r>
+                                    <a:rPr lang="en-US" sz="2400" b="0" i="1" smtClean="0">
+                                      <a:solidFill>
+                                        <a:schemeClr val="tx1"/>
+                                      </a:solidFill>
+                                      <a:latin typeface="Cambria Math" panose="02040503050406030204" pitchFamily="18" charset="0"/>
+                                      <a:cs typeface="Calibri Light" panose="020F0302020204030204" pitchFamily="34" charset="0"/>
+                                    </a:rPr>
+                                    <m:t>𝑝𝑟𝑖𝑐𝑒</m:t>
+                                  </m:r>
+                                </m:e>
+                              </m:d>
+                            </m:e>
+                          </m:func>
+                        </m:e>
+                        <m:sub>
+                          <m:r>
+                            <a:rPr lang="en-US" sz="2400" b="0" i="1" smtClean="0">
+                              <a:solidFill>
+                                <a:schemeClr val="tx1"/>
+                              </a:solidFill>
+                              <a:latin typeface="Cambria Math" panose="02040503050406030204" pitchFamily="18" charset="0"/>
+                              <a:cs typeface="Calibri Light" panose="020F0302020204030204" pitchFamily="34" charset="0"/>
+                            </a:rPr>
+                            <m:t>𝑖𝑗𝑡</m:t>
+                          </m:r>
+                        </m:sub>
+                      </m:sSub>
+                      <m:r>
+                        <a:rPr lang="en-US" sz="2400" b="0" i="1" smtClean="0">
+                          <a:solidFill>
+                            <a:schemeClr val="tx1"/>
+                          </a:solidFill>
+                          <a:latin typeface="Cambria Math" panose="02040503050406030204" pitchFamily="18" charset="0"/>
+                          <a:cs typeface="Calibri Light" panose="020F0302020204030204" pitchFamily="34" charset="0"/>
+                        </a:rPr>
+                        <m:t>=</m:t>
+                      </m:r>
+                      <m:sSub>
+                        <m:sSubPr>
+                          <m:ctrlPr>
+                            <a:rPr lang="en-US" sz="2400" b="0" i="1" smtClean="0">
+                              <a:solidFill>
+                                <a:schemeClr val="tx1"/>
+                              </a:solidFill>
+                              <a:latin typeface="Cambria Math" panose="02040503050406030204" pitchFamily="18" charset="0"/>
+                              <a:cs typeface="Calibri Light" panose="020F0302020204030204" pitchFamily="34" charset="0"/>
+                            </a:rPr>
+                          </m:ctrlPr>
+                        </m:sSubPr>
+                        <m:e>
+                          <m:r>
+                            <a:rPr lang="en-US" sz="2400" b="0" i="1" smtClean="0">
+                              <a:solidFill>
+                                <a:schemeClr val="tx1"/>
+                              </a:solidFill>
+                              <a:latin typeface="Cambria Math" panose="02040503050406030204" pitchFamily="18" charset="0"/>
+                              <a:cs typeface="Calibri Light" panose="020F0302020204030204" pitchFamily="34" charset="0"/>
+                            </a:rPr>
+                            <m:t>𝛽</m:t>
+                          </m:r>
+                        </m:e>
+                        <m:sub>
+                          <m:r>
+                            <a:rPr lang="en-US" sz="2400" b="0" i="1" smtClean="0">
+                              <a:solidFill>
+                                <a:schemeClr val="tx1"/>
+                              </a:solidFill>
+                              <a:latin typeface="Cambria Math" panose="02040503050406030204" pitchFamily="18" charset="0"/>
+                              <a:cs typeface="Calibri Light" panose="020F0302020204030204" pitchFamily="34" charset="0"/>
+                            </a:rPr>
+                            <m:t>0</m:t>
+                          </m:r>
+                        </m:sub>
+                      </m:sSub>
+                      <m:r>
+                        <a:rPr lang="en-US" sz="2400" b="0" i="1" smtClean="0">
+                          <a:solidFill>
+                            <a:schemeClr val="tx1"/>
+                          </a:solidFill>
+                          <a:latin typeface="Cambria Math" panose="02040503050406030204" pitchFamily="18" charset="0"/>
+                          <a:cs typeface="Calibri Light" panose="020F0302020204030204" pitchFamily="34" charset="0"/>
+                        </a:rPr>
+                        <m:t>+</m:t>
+                      </m:r>
+                      <m:sSub>
+                        <m:sSubPr>
+                          <m:ctrlPr>
+                            <a:rPr lang="en-US" sz="2400" b="0" i="1" smtClean="0">
+                              <a:solidFill>
+                                <a:schemeClr val="tx1"/>
+                              </a:solidFill>
+                              <a:latin typeface="Cambria Math" panose="02040503050406030204" pitchFamily="18" charset="0"/>
+                              <a:cs typeface="Calibri Light" panose="020F0302020204030204" pitchFamily="34" charset="0"/>
+                            </a:rPr>
+                          </m:ctrlPr>
+                        </m:sSubPr>
+                        <m:e>
+                          <m:r>
+                            <a:rPr lang="en-US" sz="2400" b="0" i="1" smtClean="0">
+                              <a:solidFill>
+                                <a:schemeClr val="tx1"/>
+                              </a:solidFill>
+                              <a:latin typeface="Cambria Math" panose="02040503050406030204" pitchFamily="18" charset="0"/>
+                              <a:cs typeface="Calibri Light" panose="020F0302020204030204" pitchFamily="34" charset="0"/>
+                            </a:rPr>
+                            <m:t>𝛽</m:t>
+                          </m:r>
+                        </m:e>
+                        <m:sub>
+                          <m:r>
+                            <a:rPr lang="en-US" sz="2400" b="0" i="1" smtClean="0">
+                              <a:solidFill>
+                                <a:schemeClr val="tx1"/>
+                              </a:solidFill>
+                              <a:latin typeface="Cambria Math" panose="02040503050406030204" pitchFamily="18" charset="0"/>
+                              <a:cs typeface="Calibri Light" panose="020F0302020204030204" pitchFamily="34" charset="0"/>
+                            </a:rPr>
+                            <m:t>1</m:t>
+                          </m:r>
+                        </m:sub>
+                      </m:sSub>
+                      <m:r>
+                        <a:rPr lang="en-US" sz="2400" b="0" i="1" smtClean="0">
+                          <a:solidFill>
+                            <a:schemeClr val="tx1"/>
+                          </a:solidFill>
+                          <a:latin typeface="Cambria Math" panose="02040503050406030204" pitchFamily="18" charset="0"/>
+                          <a:cs typeface="Calibri Light" panose="020F0302020204030204" pitchFamily="34" charset="0"/>
+                        </a:rPr>
+                        <m:t>𝐴𝑔</m:t>
+                      </m:r>
+                      <m:sSub>
+                        <m:sSubPr>
+                          <m:ctrlPr>
+                            <a:rPr lang="en-US" sz="2400" b="0" i="1" smtClean="0">
+                              <a:solidFill>
+                                <a:schemeClr val="tx1"/>
+                              </a:solidFill>
+                              <a:latin typeface="Cambria Math" panose="02040503050406030204" pitchFamily="18" charset="0"/>
+                              <a:cs typeface="Calibri Light" panose="020F0302020204030204" pitchFamily="34" charset="0"/>
+                            </a:rPr>
+                          </m:ctrlPr>
+                        </m:sSubPr>
+                        <m:e>
+                          <m:r>
+                            <a:rPr lang="en-US" sz="2400" b="0" i="1" smtClean="0">
+                              <a:solidFill>
+                                <a:schemeClr val="tx1"/>
+                              </a:solidFill>
+                              <a:latin typeface="Cambria Math" panose="02040503050406030204" pitchFamily="18" charset="0"/>
+                              <a:cs typeface="Calibri Light" panose="020F0302020204030204" pitchFamily="34" charset="0"/>
+                            </a:rPr>
+                            <m:t>𝑒</m:t>
+                          </m:r>
+                        </m:e>
+                        <m:sub>
+                          <m:r>
+                            <a:rPr lang="en-US" sz="2400" b="0" i="1" smtClean="0">
+                              <a:solidFill>
+                                <a:schemeClr val="tx1"/>
+                              </a:solidFill>
+                              <a:latin typeface="Cambria Math" panose="02040503050406030204" pitchFamily="18" charset="0"/>
+                              <a:cs typeface="Calibri Light" panose="020F0302020204030204" pitchFamily="34" charset="0"/>
+                            </a:rPr>
+                            <m:t>𝑖𝑡</m:t>
+                          </m:r>
+                        </m:sub>
+                      </m:sSub>
+                      <m:r>
+                        <a:rPr lang="en-US" sz="2400" b="0" i="1" smtClean="0">
+                          <a:solidFill>
+                            <a:schemeClr val="tx1"/>
+                          </a:solidFill>
+                          <a:latin typeface="Cambria Math" panose="02040503050406030204" pitchFamily="18" charset="0"/>
+                          <a:cs typeface="Calibri Light" panose="020F0302020204030204" pitchFamily="34" charset="0"/>
+                        </a:rPr>
+                        <m:t>+</m:t>
+                      </m:r>
+                      <m:sSub>
+                        <m:sSubPr>
+                          <m:ctrlPr>
+                            <a:rPr lang="en-US" sz="2400" b="0" i="1" smtClean="0">
+                              <a:solidFill>
+                                <a:schemeClr val="tx1"/>
+                              </a:solidFill>
+                              <a:latin typeface="Cambria Math" panose="02040503050406030204" pitchFamily="18" charset="0"/>
+                              <a:cs typeface="Calibri Light" panose="020F0302020204030204" pitchFamily="34" charset="0"/>
+                            </a:rPr>
+                          </m:ctrlPr>
+                        </m:sSubPr>
+                        <m:e>
+                          <m:r>
+                            <a:rPr lang="en-US" sz="2400" b="0" i="1" smtClean="0">
+                              <a:solidFill>
+                                <a:schemeClr val="tx1"/>
+                              </a:solidFill>
+                              <a:latin typeface="Cambria Math" panose="02040503050406030204" pitchFamily="18" charset="0"/>
+                              <a:cs typeface="Calibri Light" panose="020F0302020204030204" pitchFamily="34" charset="0"/>
+                            </a:rPr>
+                            <m:t>𝛽</m:t>
+                          </m:r>
+                        </m:e>
+                        <m:sub>
+                          <m:r>
+                            <a:rPr lang="en-US" sz="2400" b="0" i="1" smtClean="0">
+                              <a:solidFill>
+                                <a:schemeClr val="tx1"/>
+                              </a:solidFill>
+                              <a:latin typeface="Cambria Math" panose="02040503050406030204" pitchFamily="18" charset="0"/>
+                              <a:cs typeface="Calibri Light" panose="020F0302020204030204" pitchFamily="34" charset="0"/>
+                            </a:rPr>
+                            <m:t>2</m:t>
+                          </m:r>
+                        </m:sub>
+                      </m:sSub>
+                      <m:sSub>
+                        <m:sSubPr>
+                          <m:ctrlPr>
+                            <a:rPr lang="en-US" sz="2400" b="0" i="1" smtClean="0">
+                              <a:solidFill>
+                                <a:schemeClr val="tx1"/>
+                              </a:solidFill>
+                              <a:latin typeface="Cambria Math" panose="02040503050406030204" pitchFamily="18" charset="0"/>
+                              <a:cs typeface="Calibri Light" panose="020F0302020204030204" pitchFamily="34" charset="0"/>
+                            </a:rPr>
+                          </m:ctrlPr>
+                        </m:sSubPr>
+                        <m:e>
+                          <m:func>
+                            <m:funcPr>
+                              <m:ctrlPr>
+                                <a:rPr lang="en-US" sz="2400" b="0" i="1" smtClean="0">
+                                  <a:solidFill>
+                                    <a:schemeClr val="tx1"/>
+                                  </a:solidFill>
+                                  <a:latin typeface="Cambria Math" panose="02040503050406030204" pitchFamily="18" charset="0"/>
+                                  <a:cs typeface="Calibri Light" panose="020F0302020204030204" pitchFamily="34" charset="0"/>
+                                </a:rPr>
+                              </m:ctrlPr>
+                            </m:funcPr>
+                            <m:fName>
+                              <m:r>
+                                <m:rPr>
+                                  <m:sty m:val="p"/>
+                                </m:rPr>
+                                <a:rPr lang="en-US" sz="2400" b="0" i="0" smtClean="0">
+                                  <a:solidFill>
+                                    <a:schemeClr val="tx1"/>
+                                  </a:solidFill>
+                                  <a:latin typeface="Cambria Math" panose="02040503050406030204" pitchFamily="18" charset="0"/>
+                                  <a:cs typeface="Calibri Light" panose="020F0302020204030204" pitchFamily="34" charset="0"/>
+                                </a:rPr>
+                                <m:t>log</m:t>
+                              </m:r>
+                            </m:fName>
+                            <m:e>
+                              <m:d>
+                                <m:dPr>
+                                  <m:ctrlPr>
+                                    <a:rPr lang="en-US" sz="2400" b="0" i="1" smtClean="0">
+                                      <a:solidFill>
+                                        <a:schemeClr val="tx1"/>
+                                      </a:solidFill>
+                                      <a:latin typeface="Cambria Math" panose="02040503050406030204" pitchFamily="18" charset="0"/>
+                                      <a:cs typeface="Calibri Light" panose="020F0302020204030204" pitchFamily="34" charset="0"/>
+                                    </a:rPr>
+                                  </m:ctrlPr>
+                                </m:dPr>
+                                <m:e>
+                                  <m:r>
+                                    <a:rPr lang="en-US" sz="2400" b="0" i="1" smtClean="0">
+                                      <a:solidFill>
+                                        <a:schemeClr val="tx1"/>
+                                      </a:solidFill>
+                                      <a:latin typeface="Cambria Math" panose="02040503050406030204" pitchFamily="18" charset="0"/>
+                                      <a:cs typeface="Calibri Light" panose="020F0302020204030204" pitchFamily="34" charset="0"/>
+                                    </a:rPr>
+                                    <m:t>𝑊𝑄</m:t>
+                                  </m:r>
+                                </m:e>
+                              </m:d>
+                            </m:e>
+                          </m:func>
+                        </m:e>
+                        <m:sub>
+                          <m:r>
+                            <a:rPr lang="en-US" sz="2400" b="0" i="1" smtClean="0">
+                              <a:solidFill>
+                                <a:schemeClr val="tx1"/>
+                              </a:solidFill>
+                              <a:latin typeface="Cambria Math" panose="02040503050406030204" pitchFamily="18" charset="0"/>
+                              <a:cs typeface="Calibri Light" panose="020F0302020204030204" pitchFamily="34" charset="0"/>
+                            </a:rPr>
+                            <m:t>𝑖𝑡</m:t>
+                          </m:r>
+                        </m:sub>
+                      </m:sSub>
+                      <m:r>
+                        <a:rPr lang="en-US" sz="2400" b="0" i="1" smtClean="0">
+                          <a:solidFill>
+                            <a:schemeClr val="tx1"/>
+                          </a:solidFill>
+                          <a:latin typeface="Cambria Math" panose="02040503050406030204" pitchFamily="18" charset="0"/>
+                          <a:cs typeface="Calibri Light" panose="020F0302020204030204" pitchFamily="34" charset="0"/>
+                        </a:rPr>
+                        <m:t>+</m:t>
+                      </m:r>
+                      <m:sSub>
+                        <m:sSubPr>
+                          <m:ctrlPr>
+                            <a:rPr lang="en-US" sz="2400" b="0" i="1" smtClean="0">
+                              <a:solidFill>
+                                <a:schemeClr val="tx1"/>
+                              </a:solidFill>
+                              <a:latin typeface="Cambria Math" panose="02040503050406030204" pitchFamily="18" charset="0"/>
+                              <a:cs typeface="Calibri Light" panose="020F0302020204030204" pitchFamily="34" charset="0"/>
+                            </a:rPr>
+                          </m:ctrlPr>
+                        </m:sSubPr>
+                        <m:e>
+                          <m:r>
+                            <a:rPr lang="en-US" sz="2400" b="0" i="1" smtClean="0">
+                              <a:solidFill>
+                                <a:schemeClr val="tx1"/>
+                              </a:solidFill>
+                              <a:latin typeface="Cambria Math" panose="02040503050406030204" pitchFamily="18" charset="0"/>
+                              <a:cs typeface="Calibri Light" panose="020F0302020204030204" pitchFamily="34" charset="0"/>
+                            </a:rPr>
+                            <m:t>𝛽</m:t>
+                          </m:r>
+                        </m:e>
+                        <m:sub>
+                          <m:r>
+                            <a:rPr lang="en-US" sz="2400" b="0" i="1" smtClean="0">
+                              <a:solidFill>
+                                <a:schemeClr val="tx1"/>
+                              </a:solidFill>
+                              <a:latin typeface="Cambria Math" panose="02040503050406030204" pitchFamily="18" charset="0"/>
+                              <a:cs typeface="Calibri Light" panose="020F0302020204030204" pitchFamily="34" charset="0"/>
+                            </a:rPr>
+                            <m:t>3</m:t>
+                          </m:r>
+                        </m:sub>
+                      </m:sSub>
+                      <m:sSub>
+                        <m:sSubPr>
+                          <m:ctrlPr>
+                            <a:rPr lang="en-US" sz="2400" b="0" i="1" smtClean="0">
+                              <a:solidFill>
+                                <a:schemeClr val="tx1"/>
+                              </a:solidFill>
+                              <a:latin typeface="Cambria Math" panose="02040503050406030204" pitchFamily="18" charset="0"/>
+                              <a:cs typeface="Calibri Light" panose="020F0302020204030204" pitchFamily="34" charset="0"/>
+                            </a:rPr>
+                          </m:ctrlPr>
+                        </m:sSubPr>
+                        <m:e>
+                          <m:acc>
+                            <m:accPr>
+                              <m:chr m:val="̂"/>
+                              <m:ctrlPr>
+                                <a:rPr lang="en-US" sz="2400" b="0" i="1" smtClean="0">
+                                  <a:solidFill>
+                                    <a:schemeClr val="tx1"/>
+                                  </a:solidFill>
+                                  <a:latin typeface="Cambria Math" panose="02040503050406030204" pitchFamily="18" charset="0"/>
+                                  <a:cs typeface="Calibri Light" panose="020F0302020204030204" pitchFamily="34" charset="0"/>
+                                </a:rPr>
+                              </m:ctrlPr>
+                            </m:accPr>
+                            <m:e>
+                              <m:r>
+                                <a:rPr lang="en-US" sz="2400" b="0" i="1" smtClean="0">
+                                  <a:solidFill>
+                                    <a:schemeClr val="tx1"/>
+                                  </a:solidFill>
+                                  <a:latin typeface="Cambria Math" panose="02040503050406030204" pitchFamily="18" charset="0"/>
+                                  <a:cs typeface="Calibri Light" panose="020F0302020204030204" pitchFamily="34" charset="0"/>
+                                </a:rPr>
+                                <m:t>𝐸𝐶𝑆</m:t>
+                              </m:r>
+                            </m:e>
+                          </m:acc>
+                        </m:e>
+                        <m:sub>
+                          <m:r>
+                            <a:rPr lang="en-US" sz="2400" b="0" i="1" smtClean="0">
+                              <a:solidFill>
+                                <a:schemeClr val="tx1"/>
+                              </a:solidFill>
+                              <a:latin typeface="Cambria Math" panose="02040503050406030204" pitchFamily="18" charset="0"/>
+                              <a:cs typeface="Calibri Light" panose="020F0302020204030204" pitchFamily="34" charset="0"/>
+                            </a:rPr>
+                            <m:t>𝑗𝑡</m:t>
+                          </m:r>
+                        </m:sub>
+                      </m:sSub>
+                      <m:r>
+                        <a:rPr lang="en-US" sz="2400" b="0" i="1" smtClean="0">
+                          <a:solidFill>
+                            <a:schemeClr val="tx1"/>
+                          </a:solidFill>
+                          <a:latin typeface="Cambria Math" panose="02040503050406030204" pitchFamily="18" charset="0"/>
+                          <a:cs typeface="Calibri Light" panose="020F0302020204030204" pitchFamily="34" charset="0"/>
+                        </a:rPr>
+                        <m:t>+</m:t>
+                      </m:r>
+                      <m:sSub>
+                        <m:sSubPr>
+                          <m:ctrlPr>
+                            <a:rPr lang="en-US" sz="2400" b="0" i="1" smtClean="0">
+                              <a:solidFill>
+                                <a:schemeClr val="tx1"/>
+                              </a:solidFill>
+                              <a:latin typeface="Cambria Math" panose="02040503050406030204" pitchFamily="18" charset="0"/>
+                              <a:cs typeface="Calibri Light" panose="020F0302020204030204" pitchFamily="34" charset="0"/>
+                            </a:rPr>
+                          </m:ctrlPr>
+                        </m:sSubPr>
+                        <m:e>
+                          <m:r>
+                            <a:rPr lang="en-US" sz="2400" b="0" i="1" smtClean="0">
+                              <a:solidFill>
+                                <a:schemeClr val="tx1"/>
+                              </a:solidFill>
+                              <a:latin typeface="Cambria Math" panose="02040503050406030204" pitchFamily="18" charset="0"/>
+                              <a:cs typeface="Calibri Light" panose="020F0302020204030204" pitchFamily="34" charset="0"/>
+                            </a:rPr>
+                            <m:t>𝛼</m:t>
+                          </m:r>
+                        </m:e>
+                        <m:sub>
+                          <m:r>
+                            <a:rPr lang="en-US" sz="2400" b="0" i="1" smtClean="0">
+                              <a:solidFill>
+                                <a:schemeClr val="tx1"/>
+                              </a:solidFill>
+                              <a:latin typeface="Cambria Math" panose="02040503050406030204" pitchFamily="18" charset="0"/>
+                              <a:cs typeface="Calibri Light" panose="020F0302020204030204" pitchFamily="34" charset="0"/>
+                            </a:rPr>
+                            <m:t>𝑖</m:t>
+                          </m:r>
+                        </m:sub>
+                      </m:sSub>
+                      <m:r>
+                        <a:rPr lang="en-US" sz="2400" b="0" i="1" smtClean="0">
+                          <a:solidFill>
+                            <a:schemeClr val="tx1"/>
+                          </a:solidFill>
+                          <a:latin typeface="Cambria Math" panose="02040503050406030204" pitchFamily="18" charset="0"/>
+                          <a:cs typeface="Calibri Light" panose="020F0302020204030204" pitchFamily="34" charset="0"/>
+                        </a:rPr>
+                        <m:t>+</m:t>
+                      </m:r>
+                      <m:sSub>
+                        <m:sSubPr>
+                          <m:ctrlPr>
+                            <a:rPr lang="en-US" sz="2400" b="0" i="1" smtClean="0">
+                              <a:solidFill>
+                                <a:schemeClr val="tx1"/>
+                              </a:solidFill>
+                              <a:latin typeface="Cambria Math" panose="02040503050406030204" pitchFamily="18" charset="0"/>
+                              <a:cs typeface="Calibri Light" panose="020F0302020204030204" pitchFamily="34" charset="0"/>
+                            </a:rPr>
+                          </m:ctrlPr>
+                        </m:sSubPr>
+                        <m:e>
+                          <m:r>
+                            <a:rPr lang="en-US" sz="2400" b="0" i="1" smtClean="0">
+                              <a:solidFill>
+                                <a:schemeClr val="tx1"/>
+                              </a:solidFill>
+                              <a:latin typeface="Cambria Math" panose="02040503050406030204" pitchFamily="18" charset="0"/>
+                              <a:cs typeface="Calibri Light" panose="020F0302020204030204" pitchFamily="34" charset="0"/>
+                            </a:rPr>
+                            <m:t>𝛾</m:t>
+                          </m:r>
+                        </m:e>
+                        <m:sub>
+                          <m:r>
+                            <a:rPr lang="en-US" sz="2400" b="0" i="1" smtClean="0">
+                              <a:solidFill>
+                                <a:schemeClr val="tx1"/>
+                              </a:solidFill>
+                              <a:latin typeface="Cambria Math" panose="02040503050406030204" pitchFamily="18" charset="0"/>
+                              <a:cs typeface="Calibri Light" panose="020F0302020204030204" pitchFamily="34" charset="0"/>
+                            </a:rPr>
+                            <m:t>𝑡</m:t>
+                          </m:r>
+                        </m:sub>
+                      </m:sSub>
+                      <m:r>
+                        <a:rPr lang="en-US" sz="2400" b="0" i="1" smtClean="0">
+                          <a:solidFill>
+                            <a:schemeClr val="tx1"/>
+                          </a:solidFill>
+                          <a:latin typeface="Cambria Math" panose="02040503050406030204" pitchFamily="18" charset="0"/>
+                          <a:cs typeface="Calibri Light" panose="020F0302020204030204" pitchFamily="34" charset="0"/>
+                        </a:rPr>
+                        <m:t>+</m:t>
+                      </m:r>
+                      <m:sSub>
+                        <m:sSubPr>
+                          <m:ctrlPr>
+                            <a:rPr lang="en-US" sz="2400" b="0" i="1" smtClean="0">
+                              <a:solidFill>
+                                <a:schemeClr val="tx1"/>
+                              </a:solidFill>
+                              <a:latin typeface="Cambria Math" panose="02040503050406030204" pitchFamily="18" charset="0"/>
+                              <a:cs typeface="Calibri Light" panose="020F0302020204030204" pitchFamily="34" charset="0"/>
+                            </a:rPr>
+                          </m:ctrlPr>
+                        </m:sSubPr>
+                        <m:e>
+                          <m:r>
+                            <a:rPr lang="en-US" sz="2400" b="0" i="1" smtClean="0">
+                              <a:solidFill>
+                                <a:schemeClr val="tx1"/>
+                              </a:solidFill>
+                              <a:latin typeface="Cambria Math" panose="02040503050406030204" pitchFamily="18" charset="0"/>
+                              <a:cs typeface="Calibri Light" panose="020F0302020204030204" pitchFamily="34" charset="0"/>
+                            </a:rPr>
+                            <m:t>𝜔</m:t>
+                          </m:r>
+                        </m:e>
+                        <m:sub>
+                          <m:r>
+                            <a:rPr lang="en-US" sz="2400" b="0" i="1" smtClean="0">
+                              <a:solidFill>
+                                <a:schemeClr val="tx1"/>
+                              </a:solidFill>
+                              <a:latin typeface="Cambria Math" panose="02040503050406030204" pitchFamily="18" charset="0"/>
+                              <a:cs typeface="Calibri Light" panose="020F0302020204030204" pitchFamily="34" charset="0"/>
+                            </a:rPr>
+                            <m:t>𝑚</m:t>
+                          </m:r>
+                        </m:sub>
+                      </m:sSub>
+                      <m:r>
+                        <a:rPr lang="en-US" sz="2400" b="0" i="1" smtClean="0">
+                          <a:solidFill>
+                            <a:schemeClr val="tx1"/>
+                          </a:solidFill>
+                          <a:latin typeface="Cambria Math" panose="02040503050406030204" pitchFamily="18" charset="0"/>
+                          <a:cs typeface="Calibri Light" panose="020F0302020204030204" pitchFamily="34" charset="0"/>
+                        </a:rPr>
+                        <m:t>+</m:t>
+                      </m:r>
+                      <m:sSub>
+                        <m:sSubPr>
+                          <m:ctrlPr>
+                            <a:rPr lang="en-US" sz="2400" b="0" i="1" smtClean="0">
+                              <a:solidFill>
+                                <a:schemeClr val="tx1"/>
+                              </a:solidFill>
+                              <a:latin typeface="Cambria Math" panose="02040503050406030204" pitchFamily="18" charset="0"/>
+                              <a:cs typeface="Calibri Light" panose="020F0302020204030204" pitchFamily="34" charset="0"/>
+                            </a:rPr>
+                          </m:ctrlPr>
+                        </m:sSubPr>
+                        <m:e>
+                          <m:r>
+                            <a:rPr lang="en-US" sz="2400" b="0" i="1" smtClean="0">
+                              <a:solidFill>
+                                <a:schemeClr val="tx1"/>
+                              </a:solidFill>
+                              <a:latin typeface="Cambria Math" panose="02040503050406030204" pitchFamily="18" charset="0"/>
+                              <a:cs typeface="Calibri Light" panose="020F0302020204030204" pitchFamily="34" charset="0"/>
+                            </a:rPr>
+                            <m:t>𝜀</m:t>
+                          </m:r>
+                        </m:e>
+                        <m:sub>
+                          <m:r>
+                            <a:rPr lang="en-US" sz="2400" b="0" i="1" smtClean="0">
+                              <a:solidFill>
+                                <a:schemeClr val="tx1"/>
+                              </a:solidFill>
+                              <a:latin typeface="Cambria Math" panose="02040503050406030204" pitchFamily="18" charset="0"/>
+                              <a:cs typeface="Calibri Light" panose="020F0302020204030204" pitchFamily="34" charset="0"/>
+                            </a:rPr>
+                            <m:t>𝑖𝑗𝑡</m:t>
+                          </m:r>
+                        </m:sub>
+                      </m:sSub>
+                    </m:oMath>
+                  </m:oMathPara>
+                </a14:m>
+                <a:endParaRPr lang="en-US" sz="2400" dirty="0">
+                  <a:solidFill>
+                    <a:schemeClr val="tx1"/>
+                  </a:solidFill>
+                  <a:latin typeface="+mj-lt"/>
+                  <a:cs typeface="Calibri Light" panose="020F0302020204030204" pitchFamily="34" charset="0"/>
+                </a:endParaRPr>
+              </a:p>
+              <a:p>
+                <a:pPr lvl="1"/>
+                <a:endParaRPr lang="en-US" sz="2400" dirty="0">
+                  <a:latin typeface="+mj-lt"/>
+                  <a:cs typeface="Calibri Light" panose="020F0302020204030204" pitchFamily="34" charset="0"/>
+                </a:endParaRPr>
+              </a:p>
+            </p:txBody>
+          </p:sp>
+        </mc:Choice>
+        <mc:Fallback xmlns="">
           <p:sp>
             <p:nvSpPr>
               <p:cNvPr id="10" name="TextBox 9">
@@ -26311,8 +26301,8 @@
           <a:chExt cx="0" cy="0"/>
         </a:xfrm>
       </p:grpSpPr>
-      <mc:AlternateContent xmlns:mc="http://schemas.openxmlformats.org/markup-compatibility/2006">
-        <mc:Choice xmlns:a14="http://schemas.microsoft.com/office/drawing/2010/main" Requires="a14">
+      <mc:AlternateContent xmlns:mc="http://schemas.openxmlformats.org/markup-compatibility/2006" xmlns:a14="http://schemas.microsoft.com/office/drawing/2010/main">
+        <mc:Choice Requires="a14">
           <p:sp>
             <p:nvSpPr>
               <p:cNvPr id="10" name="TextBox 9">
@@ -27243,7 +27233,7 @@
             </p:txBody>
           </p:sp>
         </mc:Choice>
-        <mc:Fallback>
+        <mc:Fallback xmlns="">
           <p:sp>
             <p:nvSpPr>
               <p:cNvPr id="10" name="TextBox 9">
@@ -27385,8 +27375,8 @@
           <a:chExt cx="0" cy="0"/>
         </a:xfrm>
       </p:grpSpPr>
-      <mc:AlternateContent xmlns:mc="http://schemas.openxmlformats.org/markup-compatibility/2006">
-        <mc:Choice xmlns:a14="http://schemas.microsoft.com/office/drawing/2010/main" Requires="a14">
+      <mc:AlternateContent xmlns:mc="http://schemas.openxmlformats.org/markup-compatibility/2006" xmlns:a14="http://schemas.microsoft.com/office/drawing/2010/main">
+        <mc:Choice Requires="a14">
           <p:sp>
             <p:nvSpPr>
               <p:cNvPr id="10" name="TextBox 9">
@@ -28529,7 +28519,7 @@
             </p:txBody>
           </p:sp>
         </mc:Choice>
-        <mc:Fallback>
+        <mc:Fallback xmlns="">
           <p:sp>
             <p:nvSpPr>
               <p:cNvPr id="10" name="TextBox 9">
@@ -28671,8 +28661,8 @@
           <a:chExt cx="0" cy="0"/>
         </a:xfrm>
       </p:grpSpPr>
-      <mc:AlternateContent xmlns:mc="http://schemas.openxmlformats.org/markup-compatibility/2006">
-        <mc:Choice xmlns:a14="http://schemas.microsoft.com/office/drawing/2010/main" Requires="a14">
+      <mc:AlternateContent xmlns:mc="http://schemas.openxmlformats.org/markup-compatibility/2006" xmlns:a14="http://schemas.microsoft.com/office/drawing/2010/main">
+        <mc:Choice Requires="a14">
           <p:sp>
             <p:nvSpPr>
               <p:cNvPr id="10" name="TextBox 9">
@@ -30097,7 +30087,7 @@
             </p:txBody>
           </p:sp>
         </mc:Choice>
-        <mc:Fallback>
+        <mc:Fallback xmlns="">
           <p:sp>
             <p:nvSpPr>
               <p:cNvPr id="10" name="TextBox 9">
@@ -30239,8 +30229,8 @@
           <a:chExt cx="0" cy="0"/>
         </a:xfrm>
       </p:grpSpPr>
-      <mc:AlternateContent xmlns:mc="http://schemas.openxmlformats.org/markup-compatibility/2006">
-        <mc:Choice xmlns:a14="http://schemas.microsoft.com/office/drawing/2010/main" Requires="a14">
+      <mc:AlternateContent xmlns:mc="http://schemas.openxmlformats.org/markup-compatibility/2006" xmlns:a14="http://schemas.microsoft.com/office/drawing/2010/main">
+        <mc:Choice Requires="a14">
           <p:sp>
             <p:nvSpPr>
               <p:cNvPr id="10" name="TextBox 9">
@@ -30561,7 +30551,7 @@
             </p:txBody>
           </p:sp>
         </mc:Choice>
-        <mc:Fallback>
+        <mc:Fallback xmlns="">
           <p:sp>
             <p:nvSpPr>
               <p:cNvPr id="10" name="TextBox 9">
@@ -30700,8 +30690,8 @@
           </a:prstGeom>
         </p:spPr>
       </p:pic>
-      <mc:AlternateContent xmlns:mc="http://schemas.openxmlformats.org/markup-compatibility/2006">
-        <mc:Choice xmlns:a14="http://schemas.microsoft.com/office/drawing/2010/main" Requires="a14">
+      <mc:AlternateContent xmlns:mc="http://schemas.openxmlformats.org/markup-compatibility/2006" xmlns:a14="http://schemas.microsoft.com/office/drawing/2010/main">
+        <mc:Choice Requires="a14">
           <p:sp>
             <p:nvSpPr>
               <p:cNvPr id="9" name="TextBox 8">
@@ -31385,7 +31375,7 @@
             </p:txBody>
           </p:sp>
         </mc:Choice>
-        <mc:Fallback>
+        <mc:Fallback xmlns="">
           <p:sp>
             <p:nvSpPr>
               <p:cNvPr id="9" name="TextBox 8">
@@ -31714,7 +31704,7 @@
         <p:spPr>
           <a:xfrm>
             <a:off x="3509819" y="1903242"/>
-            <a:ext cx="1043610" cy="427382"/>
+            <a:ext cx="1043610" cy="770384"/>
           </a:xfrm>
           <a:prstGeom prst="roundRect">
             <a:avLst/>
@@ -31803,8 +31793,8 @@
           </a:p>
         </p:txBody>
       </p:sp>
-      <mc:AlternateContent xmlns:mc="http://schemas.openxmlformats.org/markup-compatibility/2006">
-        <mc:Choice xmlns:a14="http://schemas.microsoft.com/office/drawing/2010/main" Requires="a14">
+      <mc:AlternateContent xmlns:mc="http://schemas.openxmlformats.org/markup-compatibility/2006" xmlns:a14="http://schemas.microsoft.com/office/drawing/2010/main">
+        <mc:Choice Requires="a14">
           <p:sp>
             <p:nvSpPr>
               <p:cNvPr id="9" name="TextBox 8">
@@ -32488,7 +32478,7 @@
             </p:txBody>
           </p:sp>
         </mc:Choice>
-        <mc:Fallback>
+        <mc:Fallback xmlns="">
           <p:sp>
             <p:nvSpPr>
               <p:cNvPr id="9" name="TextBox 8">
@@ -35704,8 +35694,8 @@
           </a:p>
         </p:txBody>
       </p:sp>
-      <mc:AlternateContent xmlns:mc="http://schemas.openxmlformats.org/markup-compatibility/2006">
-        <mc:Choice xmlns:a14="http://schemas.microsoft.com/office/drawing/2010/main" Requires="a14">
+      <mc:AlternateContent xmlns:mc="http://schemas.openxmlformats.org/markup-compatibility/2006" xmlns:a14="http://schemas.microsoft.com/office/drawing/2010/main">
+        <mc:Choice Requires="a14">
           <p:sp>
             <p:nvSpPr>
               <p:cNvPr id="36" name="Title 2">
@@ -35913,7 +35903,7 @@
             </p:txBody>
           </p:sp>
         </mc:Choice>
-        <mc:Fallback>
+        <mc:Fallback xmlns="">
           <p:sp>
             <p:nvSpPr>
               <p:cNvPr id="36" name="Title 2">

</xml_diff>